<commit_message>
[OK] Clean Code Tip: too many arguments (#227)
* Adding article

* Completed article

Co-authored-by: Davide Bellone <davide.bellone>
</commit_message>
<xml_diff>
--- a/layout-cover-tips.pptx
+++ b/layout-cover-tips.pptx
@@ -516,7 +516,7 @@
           <a:p>
             <a:fld id="{8EDD969E-CD30-4974-94D4-028BE01ED462}" type="datetimeFigureOut">
               <a:rPr lang="en-US" smtClean="0"/>
-              <a:t>5/19/2021</a:t>
+              <a:t>10/13/2021</a:t>
             </a:fld>
             <a:endParaRPr lang="en-US"/>
           </a:p>
@@ -695,7 +695,7 @@
           <a:p>
             <a:fld id="{8EDD969E-CD30-4974-94D4-028BE01ED462}" type="datetimeFigureOut">
               <a:rPr lang="en-US" smtClean="0"/>
-              <a:t>5/19/2021</a:t>
+              <a:t>10/13/2021</a:t>
             </a:fld>
             <a:endParaRPr lang="en-US"/>
           </a:p>
@@ -875,7 +875,7 @@
           <a:p>
             <a:fld id="{8EDD969E-CD30-4974-94D4-028BE01ED462}" type="datetimeFigureOut">
               <a:rPr lang="en-US" smtClean="0"/>
-              <a:t>5/19/2021</a:t>
+              <a:t>10/13/2021</a:t>
             </a:fld>
             <a:endParaRPr lang="en-US"/>
           </a:p>
@@ -1045,7 +1045,7 @@
           <a:p>
             <a:fld id="{8EDD969E-CD30-4974-94D4-028BE01ED462}" type="datetimeFigureOut">
               <a:rPr lang="en-US" smtClean="0"/>
-              <a:t>5/19/2021</a:t>
+              <a:t>10/13/2021</a:t>
             </a:fld>
             <a:endParaRPr lang="en-US"/>
           </a:p>
@@ -1358,7 +1358,7 @@
           <a:p>
             <a:fld id="{8EDD969E-CD30-4974-94D4-028BE01ED462}" type="datetimeFigureOut">
               <a:rPr lang="en-US" smtClean="0"/>
-              <a:t>5/19/2021</a:t>
+              <a:t>10/13/2021</a:t>
             </a:fld>
             <a:endParaRPr lang="en-US"/>
           </a:p>
@@ -1744,7 +1744,7 @@
           <a:p>
             <a:fld id="{8EDD969E-CD30-4974-94D4-028BE01ED462}" type="datetimeFigureOut">
               <a:rPr lang="en-US" smtClean="0"/>
-              <a:t>5/19/2021</a:t>
+              <a:t>10/13/2021</a:t>
             </a:fld>
             <a:endParaRPr lang="en-US"/>
           </a:p>
@@ -2178,7 +2178,7 @@
           <a:p>
             <a:fld id="{8EDD969E-CD30-4974-94D4-028BE01ED462}" type="datetimeFigureOut">
               <a:rPr lang="en-US" smtClean="0"/>
-              <a:t>5/19/2021</a:t>
+              <a:t>10/13/2021</a:t>
             </a:fld>
             <a:endParaRPr lang="en-US"/>
           </a:p>
@@ -2296,7 +2296,7 @@
           <a:p>
             <a:fld id="{8EDD969E-CD30-4974-94D4-028BE01ED462}" type="datetimeFigureOut">
               <a:rPr lang="en-US" smtClean="0"/>
-              <a:t>5/19/2021</a:t>
+              <a:t>10/13/2021</a:t>
             </a:fld>
             <a:endParaRPr lang="en-US"/>
           </a:p>
@@ -2391,7 +2391,7 @@
           <a:p>
             <a:fld id="{8EDD969E-CD30-4974-94D4-028BE01ED462}" type="datetimeFigureOut">
               <a:rPr lang="en-US" smtClean="0"/>
-              <a:t>5/19/2021</a:t>
+              <a:t>10/13/2021</a:t>
             </a:fld>
             <a:endParaRPr lang="en-US"/>
           </a:p>
@@ -2741,7 +2741,7 @@
           <a:p>
             <a:fld id="{8EDD969E-CD30-4974-94D4-028BE01ED462}" type="datetimeFigureOut">
               <a:rPr lang="en-US" smtClean="0"/>
-              <a:t>5/19/2021</a:t>
+              <a:t>10/13/2021</a:t>
             </a:fld>
             <a:endParaRPr lang="en-US"/>
           </a:p>
@@ -3166,7 +3166,7 @@
           <a:p>
             <a:fld id="{8EDD969E-CD30-4974-94D4-028BE01ED462}" type="datetimeFigureOut">
               <a:rPr lang="en-US" smtClean="0"/>
-              <a:t>5/19/2021</a:t>
+              <a:t>10/13/2021</a:t>
             </a:fld>
             <a:endParaRPr lang="en-US"/>
           </a:p>
@@ -3452,7 +3452,7 @@
           <a:p>
             <a:fld id="{8EDD969E-CD30-4974-94D4-028BE01ED462}" type="datetimeFigureOut">
               <a:rPr lang="en-US" smtClean="0"/>
-              <a:t>5/19/2021</a:t>
+              <a:t>10/13/2021</a:t>
             </a:fld>
             <a:endParaRPr lang="en-US"/>
           </a:p>
@@ -4326,14 +4326,14 @@
             <a:pPr algn="r"/>
             <a:r>
               <a:rPr lang="en-GB" sz="8000" dirty="0"/>
-              <a:t>Tip #1</a:t>
+              <a:t>Tip #6</a:t>
             </a:r>
             <a:br>
               <a:rPr lang="en-GB" sz="8000" dirty="0"/>
             </a:br>
             <a:r>
               <a:rPr lang="en-GB" sz="8000" dirty="0"/>
-              <a:t>how to choose meaningful names</a:t>
+              <a:t>Avoid using too many arguments</a:t>
             </a:r>
             <a:endParaRPr lang="en-US" sz="8000" dirty="0"/>
           </a:p>

</xml_diff>

<commit_message>
[OK] C# tip: yield return (#238)
* Draft C# tip: yield return

* Completed article

* Updated PowerPoint layout

Co-authored-by: Davide Bellone <davide.bellone>
</commit_message>
<xml_diff>
--- a/layout-cover-tips.pptx
+++ b/layout-cover-tips.pptx
@@ -516,7 +516,7 @@
           <a:p>
             <a:fld id="{8EDD969E-CD30-4974-94D4-028BE01ED462}" type="datetimeFigureOut">
               <a:rPr lang="en-US" smtClean="0"/>
-              <a:t>10/13/2021</a:t>
+              <a:t>11/26/2021</a:t>
             </a:fld>
             <a:endParaRPr lang="en-US"/>
           </a:p>
@@ -695,7 +695,7 @@
           <a:p>
             <a:fld id="{8EDD969E-CD30-4974-94D4-028BE01ED462}" type="datetimeFigureOut">
               <a:rPr lang="en-US" smtClean="0"/>
-              <a:t>10/13/2021</a:t>
+              <a:t>11/26/2021</a:t>
             </a:fld>
             <a:endParaRPr lang="en-US"/>
           </a:p>
@@ -875,7 +875,7 @@
           <a:p>
             <a:fld id="{8EDD969E-CD30-4974-94D4-028BE01ED462}" type="datetimeFigureOut">
               <a:rPr lang="en-US" smtClean="0"/>
-              <a:t>10/13/2021</a:t>
+              <a:t>11/26/2021</a:t>
             </a:fld>
             <a:endParaRPr lang="en-US"/>
           </a:p>
@@ -1045,7 +1045,7 @@
           <a:p>
             <a:fld id="{8EDD969E-CD30-4974-94D4-028BE01ED462}" type="datetimeFigureOut">
               <a:rPr lang="en-US" smtClean="0"/>
-              <a:t>10/13/2021</a:t>
+              <a:t>11/26/2021</a:t>
             </a:fld>
             <a:endParaRPr lang="en-US"/>
           </a:p>
@@ -1358,7 +1358,7 @@
           <a:p>
             <a:fld id="{8EDD969E-CD30-4974-94D4-028BE01ED462}" type="datetimeFigureOut">
               <a:rPr lang="en-US" smtClean="0"/>
-              <a:t>10/13/2021</a:t>
+              <a:t>11/26/2021</a:t>
             </a:fld>
             <a:endParaRPr lang="en-US"/>
           </a:p>
@@ -1744,7 +1744,7 @@
           <a:p>
             <a:fld id="{8EDD969E-CD30-4974-94D4-028BE01ED462}" type="datetimeFigureOut">
               <a:rPr lang="en-US" smtClean="0"/>
-              <a:t>10/13/2021</a:t>
+              <a:t>11/26/2021</a:t>
             </a:fld>
             <a:endParaRPr lang="en-US"/>
           </a:p>
@@ -2178,7 +2178,7 @@
           <a:p>
             <a:fld id="{8EDD969E-CD30-4974-94D4-028BE01ED462}" type="datetimeFigureOut">
               <a:rPr lang="en-US" smtClean="0"/>
-              <a:t>10/13/2021</a:t>
+              <a:t>11/26/2021</a:t>
             </a:fld>
             <a:endParaRPr lang="en-US"/>
           </a:p>
@@ -2296,7 +2296,7 @@
           <a:p>
             <a:fld id="{8EDD969E-CD30-4974-94D4-028BE01ED462}" type="datetimeFigureOut">
               <a:rPr lang="en-US" smtClean="0"/>
-              <a:t>10/13/2021</a:t>
+              <a:t>11/26/2021</a:t>
             </a:fld>
             <a:endParaRPr lang="en-US"/>
           </a:p>
@@ -2391,7 +2391,7 @@
           <a:p>
             <a:fld id="{8EDD969E-CD30-4974-94D4-028BE01ED462}" type="datetimeFigureOut">
               <a:rPr lang="en-US" smtClean="0"/>
-              <a:t>10/13/2021</a:t>
+              <a:t>11/26/2021</a:t>
             </a:fld>
             <a:endParaRPr lang="en-US"/>
           </a:p>
@@ -2741,7 +2741,7 @@
           <a:p>
             <a:fld id="{8EDD969E-CD30-4974-94D4-028BE01ED462}" type="datetimeFigureOut">
               <a:rPr lang="en-US" smtClean="0"/>
-              <a:t>10/13/2021</a:t>
+              <a:t>11/26/2021</a:t>
             </a:fld>
             <a:endParaRPr lang="en-US"/>
           </a:p>
@@ -3166,7 +3166,7 @@
           <a:p>
             <a:fld id="{8EDD969E-CD30-4974-94D4-028BE01ED462}" type="datetimeFigureOut">
               <a:rPr lang="en-US" smtClean="0"/>
-              <a:t>10/13/2021</a:t>
+              <a:t>11/26/2021</a:t>
             </a:fld>
             <a:endParaRPr lang="en-US"/>
           </a:p>
@@ -3452,7 +3452,7 @@
           <a:p>
             <a:fld id="{8EDD969E-CD30-4974-94D4-028BE01ED462}" type="datetimeFigureOut">
               <a:rPr lang="en-US" smtClean="0"/>
-              <a:t>10/13/2021</a:t>
+              <a:t>11/26/2021</a:t>
             </a:fld>
             <a:endParaRPr lang="en-US"/>
           </a:p>
@@ -4044,28 +4044,35 @@
             <p:ph type="ctrTitle"/>
           </p:nvPr>
         </p:nvSpPr>
-        <p:spPr/>
+        <p:spPr>
+          <a:xfrm>
+            <a:off x="1638300" y="1432223"/>
+            <a:ext cx="8553450" cy="3035808"/>
+          </a:xfrm>
+        </p:spPr>
         <p:txBody>
           <a:bodyPr/>
           <a:lstStyle/>
           <a:p>
             <a:r>
-              <a:rPr lang="en-GB" dirty="0"/>
-              <a:t>How to </a:t>
-            </a:r>
-            <a:r>
-              <a:rPr lang="en-GB" u="sng" dirty="0"/>
-              <a:t>write good </a:t>
-            </a:r>
-            <a:r>
-              <a:rPr lang="en-GB" dirty="0" err="1"/>
-              <a:t>c#</a:t>
-            </a:r>
-            <a:r>
-              <a:rPr lang="en-GB" dirty="0"/>
-              <a:t> code</a:t>
-            </a:r>
-            <a:endParaRPr lang="en-US" dirty="0"/>
+              <a:rPr lang="en-GB" sz="6000" cap="none" dirty="0"/>
+              <a:t>TIP #7</a:t>
+            </a:r>
+            <a:br>
+              <a:rPr lang="en-GB" sz="6000" cap="none" dirty="0"/>
+            </a:br>
+            <a:r>
+              <a:rPr lang="en-GB" sz="6000" cap="none" dirty="0"/>
+              <a:t>Improving performance with </a:t>
+            </a:r>
+            <a:br>
+              <a:rPr lang="en-GB" sz="6000" cap="none" dirty="0"/>
+            </a:br>
+            <a:r>
+              <a:rPr lang="en-GB" sz="6000" i="1" cap="none" dirty="0"/>
+              <a:t>yield return</a:t>
+            </a:r>
+            <a:endParaRPr lang="en-US" sz="6000" i="1" cap="none" dirty="0"/>
           </a:p>
         </p:txBody>
       </p:sp>
@@ -4106,6 +4113,42 @@
           </a:p>
         </p:txBody>
       </p:sp>
+      <p:pic>
+        <p:nvPicPr>
+          <p:cNvPr id="5" name="Picture 4" descr="Logo&#10;&#10;Description automatically generated with medium confidence">
+            <a:extLst>
+              <a:ext uri="{FF2B5EF4-FFF2-40B4-BE49-F238E27FC236}">
+                <a16:creationId xmlns:a16="http://schemas.microsoft.com/office/drawing/2014/main" id="{A9BFA039-EAA8-4B25-9359-B266DE962D02}"/>
+              </a:ext>
+            </a:extLst>
+          </p:cNvPr>
+          <p:cNvPicPr>
+            <a:picLocks noChangeAspect="1"/>
+          </p:cNvPicPr>
+          <p:nvPr/>
+        </p:nvPicPr>
+        <p:blipFill>
+          <a:blip r:embed="rId2">
+            <a:extLst>
+              <a:ext uri="{28A0092B-C50C-407E-A947-70E740481C1C}">
+                <a14:useLocalDpi xmlns:a14="http://schemas.microsoft.com/office/drawing/2010/main" val="0"/>
+              </a:ext>
+            </a:extLst>
+          </a:blip>
+          <a:stretch>
+            <a:fillRect/>
+          </a:stretch>
+        </p:blipFill>
+        <p:spPr>
+          <a:xfrm>
+            <a:off x="1119059" y="4112636"/>
+            <a:ext cx="928998" cy="969726"/>
+          </a:xfrm>
+          <a:prstGeom prst="rect">
+            <a:avLst/>
+          </a:prstGeom>
+        </p:spPr>
+      </p:pic>
     </p:spTree>
     <p:extLst>
       <p:ext uri="{BB962C8B-B14F-4D97-AF65-F5344CB8AC3E}">
@@ -4313,8 +4356,8 @@
         </p:nvSpPr>
         <p:spPr>
           <a:xfrm>
-            <a:off x="643467" y="643467"/>
-            <a:ext cx="6516241" cy="5571066"/>
+            <a:off x="1104900" y="643467"/>
+            <a:ext cx="6054808" cy="5571066"/>
           </a:xfrm>
         </p:spPr>
         <p:txBody>
@@ -4325,17 +4368,16 @@
           <a:p>
             <a:pPr algn="r"/>
             <a:r>
-              <a:rPr lang="en-GB" sz="8000" dirty="0"/>
-              <a:t>Tip #6</a:t>
+              <a:rPr lang="en-GB" sz="6000" dirty="0"/>
+              <a:t>Tip #7</a:t>
             </a:r>
             <a:br>
-              <a:rPr lang="en-GB" sz="8000" dirty="0"/>
+              <a:rPr lang="en-GB" sz="6000" dirty="0"/>
             </a:br>
             <a:r>
-              <a:rPr lang="en-GB" sz="8000" dirty="0"/>
-              <a:t>Avoid using too many arguments</a:t>
-            </a:r>
-            <a:endParaRPr lang="en-US" sz="8000" dirty="0"/>
+              <a:rPr lang="en-US" sz="6000" dirty="0"/>
+              <a:t>Keep parameters in a consistent order</a:t>
+            </a:r>
           </a:p>
         </p:txBody>
       </p:sp>
@@ -4666,6 +4708,42 @@
           </a:p>
         </p:txBody>
       </p:sp>
+      <p:pic>
+        <p:nvPicPr>
+          <p:cNvPr id="5" name="Picture 4" descr="Logo&#10;&#10;Description automatically generated with medium confidence">
+            <a:extLst>
+              <a:ext uri="{FF2B5EF4-FFF2-40B4-BE49-F238E27FC236}">
+                <a16:creationId xmlns:a16="http://schemas.microsoft.com/office/drawing/2014/main" id="{07A3483B-1F6E-4D93-8E06-102933498B46}"/>
+              </a:ext>
+            </a:extLst>
+          </p:cNvPr>
+          <p:cNvPicPr>
+            <a:picLocks noChangeAspect="1"/>
+          </p:cNvPicPr>
+          <p:nvPr/>
+        </p:nvPicPr>
+        <p:blipFill>
+          <a:blip r:embed="rId6">
+            <a:extLst>
+              <a:ext uri="{28A0092B-C50C-407E-A947-70E740481C1C}">
+                <a14:useLocalDpi xmlns:a14="http://schemas.microsoft.com/office/drawing/2010/main" val="0"/>
+              </a:ext>
+            </a:extLst>
+          </a:blip>
+          <a:stretch>
+            <a:fillRect/>
+          </a:stretch>
+        </p:blipFill>
+        <p:spPr>
+          <a:xfrm>
+            <a:off x="1368436" y="4400725"/>
+            <a:ext cx="821077" cy="857074"/>
+          </a:xfrm>
+          <a:prstGeom prst="rect">
+            <a:avLst/>
+          </a:prstGeom>
+        </p:spPr>
+      </p:pic>
     </p:spTree>
     <p:extLst>
       <p:ext uri="{BB962C8B-B14F-4D97-AF65-F5344CB8AC3E}">

</xml_diff>

<commit_message>
Added CC tip - mental mappings (#248)
Co-authored-by: Davide Bellone <davide.bellone>
</commit_message>
<xml_diff>
--- a/layout-cover-tips.pptx
+++ b/layout-cover-tips.pptx
@@ -516,7 +516,7 @@
           <a:p>
             <a:fld id="{8EDD969E-CD30-4974-94D4-028BE01ED462}" type="datetimeFigureOut">
               <a:rPr lang="en-US" smtClean="0"/>
-              <a:t>11/26/2021</a:t>
+              <a:t>1/12/2022</a:t>
             </a:fld>
             <a:endParaRPr lang="en-US"/>
           </a:p>
@@ -695,7 +695,7 @@
           <a:p>
             <a:fld id="{8EDD969E-CD30-4974-94D4-028BE01ED462}" type="datetimeFigureOut">
               <a:rPr lang="en-US" smtClean="0"/>
-              <a:t>11/26/2021</a:t>
+              <a:t>1/12/2022</a:t>
             </a:fld>
             <a:endParaRPr lang="en-US"/>
           </a:p>
@@ -875,7 +875,7 @@
           <a:p>
             <a:fld id="{8EDD969E-CD30-4974-94D4-028BE01ED462}" type="datetimeFigureOut">
               <a:rPr lang="en-US" smtClean="0"/>
-              <a:t>11/26/2021</a:t>
+              <a:t>1/12/2022</a:t>
             </a:fld>
             <a:endParaRPr lang="en-US"/>
           </a:p>
@@ -1045,7 +1045,7 @@
           <a:p>
             <a:fld id="{8EDD969E-CD30-4974-94D4-028BE01ED462}" type="datetimeFigureOut">
               <a:rPr lang="en-US" smtClean="0"/>
-              <a:t>11/26/2021</a:t>
+              <a:t>1/12/2022</a:t>
             </a:fld>
             <a:endParaRPr lang="en-US"/>
           </a:p>
@@ -1358,7 +1358,7 @@
           <a:p>
             <a:fld id="{8EDD969E-CD30-4974-94D4-028BE01ED462}" type="datetimeFigureOut">
               <a:rPr lang="en-US" smtClean="0"/>
-              <a:t>11/26/2021</a:t>
+              <a:t>1/12/2022</a:t>
             </a:fld>
             <a:endParaRPr lang="en-US"/>
           </a:p>
@@ -1744,7 +1744,7 @@
           <a:p>
             <a:fld id="{8EDD969E-CD30-4974-94D4-028BE01ED462}" type="datetimeFigureOut">
               <a:rPr lang="en-US" smtClean="0"/>
-              <a:t>11/26/2021</a:t>
+              <a:t>1/12/2022</a:t>
             </a:fld>
             <a:endParaRPr lang="en-US"/>
           </a:p>
@@ -2178,7 +2178,7 @@
           <a:p>
             <a:fld id="{8EDD969E-CD30-4974-94D4-028BE01ED462}" type="datetimeFigureOut">
               <a:rPr lang="en-US" smtClean="0"/>
-              <a:t>11/26/2021</a:t>
+              <a:t>1/12/2022</a:t>
             </a:fld>
             <a:endParaRPr lang="en-US"/>
           </a:p>
@@ -2296,7 +2296,7 @@
           <a:p>
             <a:fld id="{8EDD969E-CD30-4974-94D4-028BE01ED462}" type="datetimeFigureOut">
               <a:rPr lang="en-US" smtClean="0"/>
-              <a:t>11/26/2021</a:t>
+              <a:t>1/12/2022</a:t>
             </a:fld>
             <a:endParaRPr lang="en-US"/>
           </a:p>
@@ -2391,7 +2391,7 @@
           <a:p>
             <a:fld id="{8EDD969E-CD30-4974-94D4-028BE01ED462}" type="datetimeFigureOut">
               <a:rPr lang="en-US" smtClean="0"/>
-              <a:t>11/26/2021</a:t>
+              <a:t>1/12/2022</a:t>
             </a:fld>
             <a:endParaRPr lang="en-US"/>
           </a:p>
@@ -2741,7 +2741,7 @@
           <a:p>
             <a:fld id="{8EDD969E-CD30-4974-94D4-028BE01ED462}" type="datetimeFigureOut">
               <a:rPr lang="en-US" smtClean="0"/>
-              <a:t>11/26/2021</a:t>
+              <a:t>1/12/2022</a:t>
             </a:fld>
             <a:endParaRPr lang="en-US"/>
           </a:p>
@@ -3166,7 +3166,7 @@
           <a:p>
             <a:fld id="{8EDD969E-CD30-4974-94D4-028BE01ED462}" type="datetimeFigureOut">
               <a:rPr lang="en-US" smtClean="0"/>
-              <a:t>11/26/2021</a:t>
+              <a:t>1/12/2022</a:t>
             </a:fld>
             <a:endParaRPr lang="en-US"/>
           </a:p>
@@ -3452,7 +3452,7 @@
           <a:p>
             <a:fld id="{8EDD969E-CD30-4974-94D4-028BE01ED462}" type="datetimeFigureOut">
               <a:rPr lang="en-US" smtClean="0"/>
-              <a:t>11/26/2021</a:t>
+              <a:t>1/12/2022</a:t>
             </a:fld>
             <a:endParaRPr lang="en-US"/>
           </a:p>
@@ -4369,14 +4369,14 @@
             <a:pPr algn="r"/>
             <a:r>
               <a:rPr lang="en-GB" sz="6000" dirty="0"/>
-              <a:t>Tip #7</a:t>
+              <a:t>Tip #8</a:t>
             </a:r>
             <a:br>
               <a:rPr lang="en-GB" sz="6000" dirty="0"/>
             </a:br>
             <a:r>
               <a:rPr lang="en-US" sz="6000" dirty="0"/>
-              <a:t>Keep parameters in a consistent order</a:t>
+              <a:t>avoid mental mappings</a:t>
             </a:r>
           </a:p>
         </p:txBody>

</xml_diff>

<commit_message>
Added cover image (#254)
Co-authored-by: Davide Bellone <davide.bellone>
</commit_message>
<xml_diff>
--- a/layout-cover-tips.pptx
+++ b/layout-cover-tips.pptx
@@ -516,7 +516,7 @@
           <a:p>
             <a:fld id="{8EDD969E-CD30-4974-94D4-028BE01ED462}" type="datetimeFigureOut">
               <a:rPr lang="en-US" smtClean="0"/>
-              <a:t>1/25/2022</a:t>
+              <a:t>2/21/2022</a:t>
             </a:fld>
             <a:endParaRPr lang="en-US"/>
           </a:p>
@@ -695,7 +695,7 @@
           <a:p>
             <a:fld id="{8EDD969E-CD30-4974-94D4-028BE01ED462}" type="datetimeFigureOut">
               <a:rPr lang="en-US" smtClean="0"/>
-              <a:t>1/25/2022</a:t>
+              <a:t>2/21/2022</a:t>
             </a:fld>
             <a:endParaRPr lang="en-US"/>
           </a:p>
@@ -875,7 +875,7 @@
           <a:p>
             <a:fld id="{8EDD969E-CD30-4974-94D4-028BE01ED462}" type="datetimeFigureOut">
               <a:rPr lang="en-US" smtClean="0"/>
-              <a:t>1/25/2022</a:t>
+              <a:t>2/21/2022</a:t>
             </a:fld>
             <a:endParaRPr lang="en-US"/>
           </a:p>
@@ -1045,7 +1045,7 @@
           <a:p>
             <a:fld id="{8EDD969E-CD30-4974-94D4-028BE01ED462}" type="datetimeFigureOut">
               <a:rPr lang="en-US" smtClean="0"/>
-              <a:t>1/25/2022</a:t>
+              <a:t>2/21/2022</a:t>
             </a:fld>
             <a:endParaRPr lang="en-US"/>
           </a:p>
@@ -1358,7 +1358,7 @@
           <a:p>
             <a:fld id="{8EDD969E-CD30-4974-94D4-028BE01ED462}" type="datetimeFigureOut">
               <a:rPr lang="en-US" smtClean="0"/>
-              <a:t>1/25/2022</a:t>
+              <a:t>2/21/2022</a:t>
             </a:fld>
             <a:endParaRPr lang="en-US"/>
           </a:p>
@@ -1744,7 +1744,7 @@
           <a:p>
             <a:fld id="{8EDD969E-CD30-4974-94D4-028BE01ED462}" type="datetimeFigureOut">
               <a:rPr lang="en-US" smtClean="0"/>
-              <a:t>1/25/2022</a:t>
+              <a:t>2/21/2022</a:t>
             </a:fld>
             <a:endParaRPr lang="en-US"/>
           </a:p>
@@ -2178,7 +2178,7 @@
           <a:p>
             <a:fld id="{8EDD969E-CD30-4974-94D4-028BE01ED462}" type="datetimeFigureOut">
               <a:rPr lang="en-US" smtClean="0"/>
-              <a:t>1/25/2022</a:t>
+              <a:t>2/21/2022</a:t>
             </a:fld>
             <a:endParaRPr lang="en-US"/>
           </a:p>
@@ -2296,7 +2296,7 @@
           <a:p>
             <a:fld id="{8EDD969E-CD30-4974-94D4-028BE01ED462}" type="datetimeFigureOut">
               <a:rPr lang="en-US" smtClean="0"/>
-              <a:t>1/25/2022</a:t>
+              <a:t>2/21/2022</a:t>
             </a:fld>
             <a:endParaRPr lang="en-US"/>
           </a:p>
@@ -2391,7 +2391,7 @@
           <a:p>
             <a:fld id="{8EDD969E-CD30-4974-94D4-028BE01ED462}" type="datetimeFigureOut">
               <a:rPr lang="en-US" smtClean="0"/>
-              <a:t>1/25/2022</a:t>
+              <a:t>2/21/2022</a:t>
             </a:fld>
             <a:endParaRPr lang="en-US"/>
           </a:p>
@@ -2741,7 +2741,7 @@
           <a:p>
             <a:fld id="{8EDD969E-CD30-4974-94D4-028BE01ED462}" type="datetimeFigureOut">
               <a:rPr lang="en-US" smtClean="0"/>
-              <a:t>1/25/2022</a:t>
+              <a:t>2/21/2022</a:t>
             </a:fld>
             <a:endParaRPr lang="en-US"/>
           </a:p>
@@ -3166,7 +3166,7 @@
           <a:p>
             <a:fld id="{8EDD969E-CD30-4974-94D4-028BE01ED462}" type="datetimeFigureOut">
               <a:rPr lang="en-US" smtClean="0"/>
-              <a:t>1/25/2022</a:t>
+              <a:t>2/21/2022</a:t>
             </a:fld>
             <a:endParaRPr lang="en-US"/>
           </a:p>
@@ -3452,7 +3452,7 @@
           <a:p>
             <a:fld id="{8EDD969E-CD30-4974-94D4-028BE01ED462}" type="datetimeFigureOut">
               <a:rPr lang="en-US" smtClean="0"/>
-              <a:t>1/25/2022</a:t>
+              <a:t>2/21/2022</a:t>
             </a:fld>
             <a:endParaRPr lang="en-US"/>
           </a:p>
@@ -4014,166 +4014,36 @@
 <file path=ppt/slides/slide1.xml><?xml version="1.0" encoding="utf-8"?>
 <p:sld xmlns:a="http://schemas.openxmlformats.org/drawingml/2006/main" xmlns:r="http://schemas.openxmlformats.org/officeDocument/2006/relationships" xmlns:p="http://schemas.openxmlformats.org/presentationml/2006/main">
   <p:cSld>
-    <p:spTree>
-      <p:nvGrpSpPr>
-        <p:cNvPr id="1" name=""/>
-        <p:cNvGrpSpPr/>
-        <p:nvPr/>
-      </p:nvGrpSpPr>
-      <p:grpSpPr>
-        <a:xfrm>
-          <a:off x="0" y="0"/>
-          <a:ext cx="0" cy="0"/>
-          <a:chOff x="0" y="0"/>
-          <a:chExt cx="0" cy="0"/>
-        </a:xfrm>
-      </p:grpSpPr>
-      <p:sp>
-        <p:nvSpPr>
-          <p:cNvPr id="2" name="Title 1">
-            <a:extLst>
-              <a:ext uri="{FF2B5EF4-FFF2-40B4-BE49-F238E27FC236}">
-                <a16:creationId xmlns:a16="http://schemas.microsoft.com/office/drawing/2014/main" id="{A4168FF9-3F52-4F30-9F57-324B0195FBD7}"/>
-              </a:ext>
-            </a:extLst>
-          </p:cNvPr>
-          <p:cNvSpPr>
-            <a:spLocks noGrp="1"/>
-          </p:cNvSpPr>
-          <p:nvPr>
-            <p:ph type="ctrTitle"/>
-          </p:nvPr>
-        </p:nvSpPr>
-        <p:spPr>
-          <a:xfrm>
-            <a:off x="1638300" y="1432223"/>
-            <a:ext cx="8553450" cy="3035808"/>
-          </a:xfrm>
-        </p:spPr>
-        <p:txBody>
-          <a:bodyPr/>
-          <a:lstStyle/>
-          <a:p>
-            <a:r>
-              <a:rPr lang="en-GB" sz="6000" cap="none" dirty="0"/>
-              <a:t>TIP #8</a:t>
-            </a:r>
-            <a:br>
-              <a:rPr lang="en-GB" sz="6000" cap="none" dirty="0"/>
-            </a:br>
-            <a:r>
-              <a:rPr lang="en-GB" sz="6000" i="1" u="sng" cap="none" dirty="0"/>
-              <a:t>when</a:t>
-            </a:r>
-            <a:r>
-              <a:rPr lang="en-GB" sz="6000" cap="none" dirty="0"/>
-              <a:t> + </a:t>
-            </a:r>
-            <a:r>
-              <a:rPr lang="en-GB" sz="6000" i="1" u="sng" cap="none" dirty="0"/>
-              <a:t>catch</a:t>
-            </a:r>
-            <a:r>
-              <a:rPr lang="en-GB" sz="6000" i="1" cap="none" dirty="0"/>
-              <a:t> </a:t>
-            </a:r>
-            <a:r>
-              <a:rPr lang="en-GB" sz="6000" cap="none" dirty="0"/>
-              <a:t>: handle exceptions gracefully</a:t>
-            </a:r>
-            <a:endParaRPr lang="en-US" sz="6000" i="1" cap="none" dirty="0"/>
-          </a:p>
-        </p:txBody>
-      </p:sp>
-      <p:sp>
-        <p:nvSpPr>
-          <p:cNvPr id="3" name="Subtitle 2">
-            <a:extLst>
-              <a:ext uri="{FF2B5EF4-FFF2-40B4-BE49-F238E27FC236}">
-                <a16:creationId xmlns:a16="http://schemas.microsoft.com/office/drawing/2014/main" id="{F23F9D91-4FBA-49AA-9DD2-D000CEE46A30}"/>
-              </a:ext>
-            </a:extLst>
-          </p:cNvPr>
-          <p:cNvSpPr>
-            <a:spLocks noGrp="1"/>
-          </p:cNvSpPr>
-          <p:nvPr>
-            <p:ph type="subTitle" idx="1"/>
-          </p:nvPr>
-        </p:nvSpPr>
-        <p:spPr>
-          <a:xfrm>
-            <a:off x="1717548" y="4355929"/>
-            <a:ext cx="7891272" cy="1069848"/>
-          </a:xfrm>
-        </p:spPr>
-        <p:txBody>
-          <a:bodyPr>
-            <a:normAutofit/>
-          </a:bodyPr>
-          <a:lstStyle/>
-          <a:p>
-            <a:pPr algn="r"/>
-            <a:r>
-              <a:rPr lang="en-GB" sz="4000" dirty="0"/>
-              <a:t>C# tips</a:t>
-            </a:r>
-            <a:endParaRPr lang="en-US" sz="4000" dirty="0"/>
-          </a:p>
-        </p:txBody>
-      </p:sp>
-      <p:pic>
-        <p:nvPicPr>
-          <p:cNvPr id="5" name="Picture 4" descr="Logo&#10;&#10;Description automatically generated with medium confidence">
-            <a:extLst>
-              <a:ext uri="{FF2B5EF4-FFF2-40B4-BE49-F238E27FC236}">
-                <a16:creationId xmlns:a16="http://schemas.microsoft.com/office/drawing/2014/main" id="{A9BFA039-EAA8-4B25-9359-B266DE962D02}"/>
-              </a:ext>
-            </a:extLst>
-          </p:cNvPr>
-          <p:cNvPicPr>
-            <a:picLocks noChangeAspect="1"/>
-          </p:cNvPicPr>
-          <p:nvPr/>
-        </p:nvPicPr>
-        <p:blipFill>
-          <a:blip r:embed="rId2">
-            <a:extLst>
-              <a:ext uri="{28A0092B-C50C-407E-A947-70E740481C1C}">
-                <a14:useLocalDpi xmlns:a14="http://schemas.microsoft.com/office/drawing/2010/main" val="0"/>
-              </a:ext>
-            </a:extLst>
-          </a:blip>
-          <a:stretch>
-            <a:fillRect/>
-          </a:stretch>
-        </p:blipFill>
-        <p:spPr>
-          <a:xfrm>
-            <a:off x="1119059" y="4112636"/>
-            <a:ext cx="928998" cy="969726"/>
-          </a:xfrm>
-          <a:prstGeom prst="rect">
-            <a:avLst/>
-          </a:prstGeom>
-        </p:spPr>
-      </p:pic>
-    </p:spTree>
-    <p:extLst>
-      <p:ext uri="{BB962C8B-B14F-4D97-AF65-F5344CB8AC3E}">
-        <p14:creationId xmlns:p14="http://schemas.microsoft.com/office/powerpoint/2010/main" val="2391933161"/>
-      </p:ext>
-    </p:extLst>
-  </p:cSld>
-  <p:clrMapOvr>
-    <a:masterClrMapping/>
-  </p:clrMapOvr>
-</p:sld>
-</file>
-
-<file path=ppt/slides/slide2.xml><?xml version="1.0" encoding="utf-8"?>
-<p:sld xmlns:a="http://schemas.openxmlformats.org/drawingml/2006/main" xmlns:r="http://schemas.openxmlformats.org/officeDocument/2006/relationships" xmlns:p="http://schemas.openxmlformats.org/presentationml/2006/main">
-  <p:cSld>
+    <p:bg>
+      <p:bgPr>
+        <a:gradFill flip="none" rotWithShape="1">
+          <a:gsLst>
+            <a:gs pos="0">
+              <a:schemeClr val="accent1">
+                <a:lumMod val="0"/>
+                <a:lumOff val="100000"/>
+              </a:schemeClr>
+            </a:gs>
+            <a:gs pos="46000">
+              <a:schemeClr val="accent1">
+                <a:lumMod val="0"/>
+                <a:lumOff val="100000"/>
+              </a:schemeClr>
+            </a:gs>
+            <a:gs pos="100000">
+              <a:schemeClr val="accent1">
+                <a:lumMod val="100000"/>
+              </a:schemeClr>
+            </a:gs>
+          </a:gsLst>
+          <a:path path="circle">
+            <a:fillToRect l="100000" t="100000"/>
+          </a:path>
+          <a:tileRect r="-100000" b="-100000"/>
+        </a:gradFill>
+        <a:effectLst/>
+      </p:bgPr>
+    </p:bg>
     <p:spTree>
       <p:nvGrpSpPr>
         <p:cNvPr id="1" name=""/>
@@ -4190,7 +4060,7 @@
       </p:grpSpPr>
       <p:sp useBgFill="1">
         <p:nvSpPr>
-          <p:cNvPr id="8" name="Rectangle 7">
+          <p:cNvPr id="10" name="Rectangle 9">
             <a:extLst>
               <a:ext uri="{FF2B5EF4-FFF2-40B4-BE49-F238E27FC236}">
                 <a16:creationId xmlns:a16="http://schemas.microsoft.com/office/drawing/2014/main" id="{E8035907-EB9C-4E11-8A9B-D25B0AD8D749}"/>
@@ -4213,7 +4083,7 @@
         </p:nvSpPr>
         <p:spPr bwMode="white">
           <a:xfrm>
-            <a:off x="0" y="0"/>
+            <a:off x="1524" y="0"/>
             <a:ext cx="12188952" cy="6858001"/>
           </a:xfrm>
           <a:prstGeom prst="rect">
@@ -4365,34 +4235,54 @@
         </p:nvSpPr>
         <p:spPr>
           <a:xfrm>
-            <a:off x="1104900" y="643467"/>
-            <a:ext cx="6054808" cy="5571066"/>
+            <a:off x="643467" y="1673352"/>
+            <a:ext cx="6516241" cy="3849020"/>
           </a:xfrm>
         </p:spPr>
         <p:txBody>
-          <a:bodyPr>
-            <a:normAutofit/>
+          <a:bodyPr anchor="b">
+            <a:normAutofit fontScale="90000"/>
           </a:bodyPr>
           <a:lstStyle/>
           <a:p>
             <a:pPr algn="r"/>
             <a:r>
-              <a:rPr lang="en-GB" sz="6000" dirty="0"/>
-              <a:t>Tip #8</a:t>
+              <a:rPr lang="en-GB" sz="6000" u="sng" cap="none" dirty="0"/>
+              <a:t>C# TIP</a:t>
             </a:r>
             <a:br>
-              <a:rPr lang="en-GB" sz="6000" dirty="0"/>
+              <a:rPr lang="en-GB" sz="7500" cap="none" dirty="0"/>
             </a:br>
-            <a:r>
-              <a:rPr lang="en-US" sz="6000" dirty="0"/>
-              <a:t>avoid mental mappings</a:t>
-            </a:r>
-          </a:p>
-        </p:txBody>
-      </p:sp>
-      <p:sp>
-        <p:nvSpPr>
-          <p:cNvPr id="10" name="Rectangle 9">
+            <a:br>
+              <a:rPr lang="en-GB" sz="7500" cap="none" dirty="0"/>
+            </a:br>
+            <a:r>
+              <a:rPr lang="en-GB" sz="7500" i="1" u="sng" cap="none" dirty="0"/>
+              <a:t>when</a:t>
+            </a:r>
+            <a:r>
+              <a:rPr lang="en-GB" sz="7500" cap="none" dirty="0"/>
+              <a:t> + </a:t>
+            </a:r>
+            <a:r>
+              <a:rPr lang="en-GB" sz="7500" i="1" u="sng" cap="none" dirty="0"/>
+              <a:t>catch</a:t>
+            </a:r>
+            <a:r>
+              <a:rPr lang="en-GB" sz="7500" i="1" cap="none" dirty="0"/>
+              <a:t> </a:t>
+            </a:r>
+            <a:r>
+              <a:rPr lang="en-GB" sz="7500" cap="none" dirty="0"/>
+              <a:t>to handle exceptions gracefully</a:t>
+            </a:r>
+            <a:endParaRPr lang="en-US" sz="7500" i="1" cap="none" dirty="0"/>
+          </a:p>
+        </p:txBody>
+      </p:sp>
+      <p:sp>
+        <p:nvSpPr>
+          <p:cNvPr id="12" name="Rectangle 11">
             <a:extLst>
               <a:ext uri="{FF2B5EF4-FFF2-40B4-BE49-F238E27FC236}">
                 <a16:creationId xmlns:a16="http://schemas.microsoft.com/office/drawing/2014/main" id="{D9C69FA7-0958-4ED9-A0DF-E87A0C137BF5}"/>
@@ -4464,21 +4354,21 @@
           </a:fontRef>
         </p:style>
       </p:sp>
-      <p:grpSp>
-        <p:nvGrpSpPr>
-          <p:cNvPr id="12" name="Group 11">
+      <p:sp>
+        <p:nvSpPr>
+          <p:cNvPr id="14" name="Freeform: Shape 13">
             <a:extLst>
               <a:ext uri="{FF2B5EF4-FFF2-40B4-BE49-F238E27FC236}">
-                <a16:creationId xmlns:a16="http://schemas.microsoft.com/office/drawing/2014/main" id="{FDB0A998-A5C6-45CB-ACF3-1CF6399202AB}"/>
+                <a16:creationId xmlns:a16="http://schemas.microsoft.com/office/drawing/2014/main" id="{2399E32A-F900-43E6-8B7A-F5B4BF1A3184}"/>
               </a:ext>
               <a:ext uri="{C183D7F6-B498-43B3-948B-1728B52AA6E4}">
                 <adec:decorative xmlns:adec="http://schemas.microsoft.com/office/drawing/2017/decorative" val="1"/>
               </a:ext>
             </a:extLst>
           </p:cNvPr>
-          <p:cNvGrpSpPr>
-            <a:grpSpLocks noGrp="1" noUngrp="1" noRot="1" noChangeAspect="1" noMove="1" noResize="1"/>
-          </p:cNvGrpSpPr>
+          <p:cNvSpPr>
+            <a:spLocks noGrp="1" noRot="1" noChangeAspect="1" noMove="1" noResize="1" noEditPoints="1" noAdjustHandles="1" noChangeArrowheads="1" noChangeShapeType="1" noTextEdit="1"/>
+          </p:cNvSpPr>
           <p:nvPr>
             <p:extLst>
               <p:ext uri="{386F3935-93C4-4BCD-93E2-E3B085C9AB24}">
@@ -4486,234 +4376,586 @@
               </p:ext>
             </p:extLst>
           </p:nvPr>
-        </p:nvGrpSpPr>
-        <p:grpSpPr>
+        </p:nvSpPr>
+        <p:spPr>
           <a:xfrm>
-            <a:off x="7933595" y="1903304"/>
-            <a:ext cx="3051394" cy="3051388"/>
-            <a:chOff x="7933595" y="1903304"/>
-            <a:chExt cx="3051394" cy="3051388"/>
+            <a:off x="7903310" y="1673352"/>
+            <a:ext cx="3502152" cy="3502152"/>
           </a:xfrm>
-        </p:grpSpPr>
-        <p:sp>
-          <p:nvSpPr>
-            <p:cNvPr id="13" name="Oval 12">
-              <a:extLst>
-                <a:ext uri="{FF2B5EF4-FFF2-40B4-BE49-F238E27FC236}">
-                  <a16:creationId xmlns:a16="http://schemas.microsoft.com/office/drawing/2014/main" id="{4AB5B6FA-7B4F-437A-9C78-144C7DCD1EC6}"/>
-                </a:ext>
-                <a:ext uri="{C183D7F6-B498-43B3-948B-1728B52AA6E4}">
-                  <adec:decorative xmlns:adec="http://schemas.microsoft.com/office/drawing/2017/decorative" val="1"/>
-                </a:ext>
-              </a:extLst>
-            </p:cNvPr>
-            <p:cNvSpPr/>
-            <p:nvPr>
-              <p:extLst>
-                <p:ext uri="{386F3935-93C4-4BCD-93E2-E3B085C9AB24}">
-                  <p16:designElem xmlns:p16="http://schemas.microsoft.com/office/powerpoint/2015/main" val="1"/>
-                </p:ext>
-              </p:extLst>
-            </p:nvPr>
-          </p:nvSpPr>
-          <p:spPr>
-            <a:xfrm>
-              <a:off x="7933595" y="1903304"/>
-              <a:ext cx="3051394" cy="3051388"/>
-            </a:xfrm>
-            <a:prstGeom prst="ellipse">
-              <a:avLst/>
-            </a:prstGeom>
-            <a:blipFill dpi="0" rotWithShape="1">
-              <a:blip r:embed="rId4">
-                <a:duotone>
-                  <a:schemeClr val="accent1">
-                    <a:shade val="45000"/>
-                    <a:satMod val="135000"/>
-                  </a:schemeClr>
-                  <a:prstClr val="white"/>
-                </a:duotone>
-                <a:extLst>
-                  <a:ext uri="{BEBA8EAE-BF5A-486C-A8C5-ECC9F3942E4B}">
-                    <a14:imgProps xmlns:a14="http://schemas.microsoft.com/office/drawing/2010/main">
-                      <a14:imgLayer r:embed="rId5">
-                        <a14:imgEffect>
-                          <a14:saturation sat="400000"/>
-                        </a14:imgEffect>
-                        <a14:imgEffect>
-                          <a14:brightnessContrast bright="-40000" contrast="40000"/>
-                        </a14:imgEffect>
-                      </a14:imgLayer>
-                    </a14:imgProps>
-                  </a:ext>
-                </a:extLst>
-              </a:blip>
-              <a:srcRect/>
-              <a:tile tx="0" ty="0" sx="85000" sy="85000" flip="none" algn="tl"/>
-            </a:blipFill>
-            <a:ln w="25400" cap="flat" cmpd="sng" algn="ctr">
-              <a:noFill/>
-              <a:prstDash val="solid"/>
-            </a:ln>
-            <a:effectLst/>
-          </p:spPr>
-          <p:txBody>
-            <a:bodyPr lIns="0" tIns="0" rIns="0" bIns="0" rtlCol="0" anchor="ctr"/>
-            <a:lstStyle/>
-            <a:p>
-              <a:pPr marL="0" marR="0" lvl="0" indent="0" algn="ctr" defTabSz="914400" eaLnBrk="1" fontAlgn="auto" latinLnBrk="0" hangingPunct="1">
-                <a:lnSpc>
-                  <a:spcPct val="100000"/>
-                </a:lnSpc>
-                <a:spcBef>
-                  <a:spcPts val="0"/>
-                </a:spcBef>
-                <a:spcAft>
-                  <a:spcPts val="0"/>
-                </a:spcAft>
-                <a:buClrTx/>
-                <a:buSzTx/>
-                <a:buFontTx/>
-                <a:buNone/>
-                <a:tabLst/>
-                <a:defRPr/>
-              </a:pPr>
-              <a:endParaRPr kumimoji="0" lang="en-US" sz="2000" b="0" i="0" u="none" strike="noStrike" kern="0" cap="none" spc="0" normalizeH="0" baseline="0" noProof="0" dirty="0">
-                <a:ln>
-                  <a:noFill/>
-                </a:ln>
-                <a:solidFill>
-                  <a:prstClr val="white"/>
-                </a:solidFill>
-                <a:effectLst/>
-                <a:uLnTx/>
-                <a:uFillTx/>
-                <a:latin typeface="Rockwell Extra Bold" pitchFamily="18" charset="0"/>
-                <a:ea typeface="+mn-ea"/>
-                <a:cs typeface="+mn-cs"/>
-              </a:endParaRPr>
-            </a:p>
-          </p:txBody>
-        </p:sp>
-        <p:sp>
-          <p:nvSpPr>
-            <p:cNvPr id="14" name="Oval 13">
-              <a:extLst>
-                <a:ext uri="{FF2B5EF4-FFF2-40B4-BE49-F238E27FC236}">
-                  <a16:creationId xmlns:a16="http://schemas.microsoft.com/office/drawing/2014/main" id="{A4199C21-6AE0-4F6F-AA96-6FFF97BB95EB}"/>
-                </a:ext>
-                <a:ext uri="{C183D7F6-B498-43B3-948B-1728B52AA6E4}">
-                  <adec:decorative xmlns:adec="http://schemas.microsoft.com/office/drawing/2017/decorative" val="1"/>
-                </a:ext>
-              </a:extLst>
-            </p:cNvPr>
-            <p:cNvSpPr/>
-            <p:nvPr>
-              <p:extLst>
-                <p:ext uri="{386F3935-93C4-4BCD-93E2-E3B085C9AB24}">
-                  <p16:designElem xmlns:p16="http://schemas.microsoft.com/office/powerpoint/2015/main" val="1"/>
-                </p:ext>
-              </p:extLst>
-            </p:nvPr>
-          </p:nvSpPr>
-          <p:spPr>
-            <a:xfrm>
-              <a:off x="8095024" y="2064730"/>
-              <a:ext cx="2728540" cy="2728536"/>
-            </a:xfrm>
-            <a:prstGeom prst="ellipse">
-              <a:avLst/>
-            </a:prstGeom>
+          <a:custGeom>
+            <a:avLst/>
+            <a:gdLst>
+              <a:gd name="connsiteX0" fmla="*/ 1751076 w 3502152"/>
+              <a:gd name="connsiteY0" fmla="*/ 228600 h 3502152"/>
+              <a:gd name="connsiteX1" fmla="*/ 228600 w 3502152"/>
+              <a:gd name="connsiteY1" fmla="*/ 1751076 h 3502152"/>
+              <a:gd name="connsiteX2" fmla="*/ 1751076 w 3502152"/>
+              <a:gd name="connsiteY2" fmla="*/ 3273552 h 3502152"/>
+              <a:gd name="connsiteX3" fmla="*/ 3273552 w 3502152"/>
+              <a:gd name="connsiteY3" fmla="*/ 1751076 h 3502152"/>
+              <a:gd name="connsiteX4" fmla="*/ 1751076 w 3502152"/>
+              <a:gd name="connsiteY4" fmla="*/ 228600 h 3502152"/>
+              <a:gd name="connsiteX5" fmla="*/ 1751076 w 3502152"/>
+              <a:gd name="connsiteY5" fmla="*/ 0 h 3502152"/>
+              <a:gd name="connsiteX6" fmla="*/ 3502152 w 3502152"/>
+              <a:gd name="connsiteY6" fmla="*/ 1751076 h 3502152"/>
+              <a:gd name="connsiteX7" fmla="*/ 1751076 w 3502152"/>
+              <a:gd name="connsiteY7" fmla="*/ 3502152 h 3502152"/>
+              <a:gd name="connsiteX8" fmla="*/ 0 w 3502152"/>
+              <a:gd name="connsiteY8" fmla="*/ 1751076 h 3502152"/>
+              <a:gd name="connsiteX9" fmla="*/ 1751076 w 3502152"/>
+              <a:gd name="connsiteY9" fmla="*/ 0 h 3502152"/>
+            </a:gdLst>
+            <a:ahLst/>
+            <a:cxnLst>
+              <a:cxn ang="0">
+                <a:pos x="connsiteX0" y="connsiteY0"/>
+              </a:cxn>
+              <a:cxn ang="0">
+                <a:pos x="connsiteX1" y="connsiteY1"/>
+              </a:cxn>
+              <a:cxn ang="0">
+                <a:pos x="connsiteX2" y="connsiteY2"/>
+              </a:cxn>
+              <a:cxn ang="0">
+                <a:pos x="connsiteX3" y="connsiteY3"/>
+              </a:cxn>
+              <a:cxn ang="0">
+                <a:pos x="connsiteX4" y="connsiteY4"/>
+              </a:cxn>
+              <a:cxn ang="0">
+                <a:pos x="connsiteX5" y="connsiteY5"/>
+              </a:cxn>
+              <a:cxn ang="0">
+                <a:pos x="connsiteX6" y="connsiteY6"/>
+              </a:cxn>
+              <a:cxn ang="0">
+                <a:pos x="connsiteX7" y="connsiteY7"/>
+              </a:cxn>
+              <a:cxn ang="0">
+                <a:pos x="connsiteX8" y="connsiteY8"/>
+              </a:cxn>
+              <a:cxn ang="0">
+                <a:pos x="connsiteX9" y="connsiteY9"/>
+              </a:cxn>
+            </a:cxnLst>
+            <a:rect l="l" t="t" r="r" b="b"/>
+            <a:pathLst>
+              <a:path w="3502152" h="3502152">
+                <a:moveTo>
+                  <a:pt x="1751076" y="228600"/>
+                </a:moveTo>
+                <a:cubicBezTo>
+                  <a:pt x="910236" y="228600"/>
+                  <a:pt x="228600" y="910236"/>
+                  <a:pt x="228600" y="1751076"/>
+                </a:cubicBezTo>
+                <a:cubicBezTo>
+                  <a:pt x="228600" y="2591916"/>
+                  <a:pt x="910236" y="3273552"/>
+                  <a:pt x="1751076" y="3273552"/>
+                </a:cubicBezTo>
+                <a:cubicBezTo>
+                  <a:pt x="2591916" y="3273552"/>
+                  <a:pt x="3273552" y="2591916"/>
+                  <a:pt x="3273552" y="1751076"/>
+                </a:cubicBezTo>
+                <a:cubicBezTo>
+                  <a:pt x="3273552" y="910236"/>
+                  <a:pt x="2591916" y="228600"/>
+                  <a:pt x="1751076" y="228600"/>
+                </a:cubicBezTo>
+                <a:close/>
+                <a:moveTo>
+                  <a:pt x="1751076" y="0"/>
+                </a:moveTo>
+                <a:cubicBezTo>
+                  <a:pt x="2718169" y="0"/>
+                  <a:pt x="3502152" y="783983"/>
+                  <a:pt x="3502152" y="1751076"/>
+                </a:cubicBezTo>
+                <a:cubicBezTo>
+                  <a:pt x="3502152" y="2718169"/>
+                  <a:pt x="2718169" y="3502152"/>
+                  <a:pt x="1751076" y="3502152"/>
+                </a:cubicBezTo>
+                <a:cubicBezTo>
+                  <a:pt x="783983" y="3502152"/>
+                  <a:pt x="0" y="2718169"/>
+                  <a:pt x="0" y="1751076"/>
+                </a:cubicBezTo>
+                <a:cubicBezTo>
+                  <a:pt x="0" y="783983"/>
+                  <a:pt x="783983" y="0"/>
+                  <a:pt x="1751076" y="0"/>
+                </a:cubicBezTo>
+                <a:close/>
+              </a:path>
+            </a:pathLst>
+          </a:custGeom>
+          <a:ln>
             <a:noFill/>
-            <a:ln w="25400" cap="flat" cmpd="sng" algn="ctr">
-              <a:solidFill>
-                <a:sysClr val="window" lastClr="FFFFFF"/>
-              </a:solidFill>
-              <a:prstDash val="solid"/>
-            </a:ln>
-            <a:effectLst/>
-          </p:spPr>
-          <p:txBody>
-            <a:bodyPr rtlCol="0" anchor="ctr"/>
-            <a:lstStyle/>
-            <a:p>
-              <a:pPr marL="0" marR="0" lvl="0" indent="0" algn="ctr" defTabSz="914400" eaLnBrk="1" fontAlgn="auto" latinLnBrk="0" hangingPunct="1">
-                <a:lnSpc>
-                  <a:spcPct val="100000"/>
-                </a:lnSpc>
-                <a:spcBef>
-                  <a:spcPts val="0"/>
-                </a:spcBef>
-                <a:spcAft>
-                  <a:spcPts val="0"/>
-                </a:spcAft>
-                <a:buClrTx/>
-                <a:buSzTx/>
-                <a:buFontTx/>
-                <a:buNone/>
-                <a:tabLst/>
-                <a:defRPr/>
-              </a:pPr>
-              <a:endParaRPr kumimoji="0" lang="en-US" sz="1800" b="0" i="0" u="none" strike="noStrike" kern="0" cap="none" spc="0" normalizeH="0" baseline="0" noProof="0" dirty="0">
-                <a:ln>
-                  <a:noFill/>
-                </a:ln>
-                <a:solidFill>
-                  <a:prstClr val="white"/>
-                </a:solidFill>
-                <a:effectLst/>
-                <a:uLnTx/>
-                <a:uFillTx/>
-                <a:latin typeface="Calibri"/>
-                <a:ea typeface="+mn-ea"/>
-                <a:cs typeface="+mn-cs"/>
-              </a:endParaRPr>
-            </a:p>
-          </p:txBody>
-        </p:sp>
-      </p:grpSp>
-      <p:sp>
-        <p:nvSpPr>
-          <p:cNvPr id="3" name="Subtitle 2">
+          </a:ln>
+        </p:spPr>
+        <p:style>
+          <a:lnRef idx="2">
+            <a:schemeClr val="accent1">
+              <a:shade val="50000"/>
+            </a:schemeClr>
+          </a:lnRef>
+          <a:fillRef idx="1">
+            <a:schemeClr val="accent1"/>
+          </a:fillRef>
+          <a:effectRef idx="0">
+            <a:schemeClr val="accent1"/>
+          </a:effectRef>
+          <a:fontRef idx="minor">
+            <a:schemeClr val="lt1"/>
+          </a:fontRef>
+        </p:style>
+        <p:txBody>
+          <a:bodyPr wrap="square" rtlCol="0" anchor="ctr">
+            <a:noAutofit/>
+          </a:bodyPr>
+          <a:lstStyle/>
+          <a:p>
+            <a:pPr algn="ctr"/>
+            <a:endParaRPr lang="en-US"/>
+          </a:p>
+        </p:txBody>
+      </p:sp>
+      <p:pic>
+        <p:nvPicPr>
+          <p:cNvPr id="5" name="Picture 4" descr="Logo&#10;&#10;Description automatically generated with medium confidence">
             <a:extLst>
               <a:ext uri="{FF2B5EF4-FFF2-40B4-BE49-F238E27FC236}">
-                <a16:creationId xmlns:a16="http://schemas.microsoft.com/office/drawing/2014/main" id="{F23F9D91-4FBA-49AA-9DD2-D000CEE46A30}"/>
+                <a16:creationId xmlns:a16="http://schemas.microsoft.com/office/drawing/2014/main" id="{A9BFA039-EAA8-4B25-9359-B266DE962D02}"/>
               </a:ext>
             </a:extLst>
           </p:cNvPr>
-          <p:cNvSpPr>
-            <a:spLocks noGrp="1"/>
-          </p:cNvSpPr>
-          <p:nvPr>
-            <p:ph type="subTitle" idx="1"/>
-          </p:nvPr>
-        </p:nvSpPr>
+          <p:cNvPicPr>
+            <a:picLocks noChangeAspect="1"/>
+          </p:cNvPicPr>
+          <p:nvPr/>
+        </p:nvPicPr>
+        <p:blipFill>
+          <a:blip r:embed="rId4">
+            <a:extLst>
+              <a:ext uri="{28A0092B-C50C-407E-A947-70E740481C1C}">
+                <a14:useLocalDpi xmlns:a14="http://schemas.microsoft.com/office/drawing/2010/main" val="0"/>
+              </a:ext>
+            </a:extLst>
+          </a:blip>
+          <a:stretch>
+            <a:fillRect/>
+          </a:stretch>
+        </p:blipFill>
         <p:spPr>
           <a:xfrm>
-            <a:off x="7942562" y="2224342"/>
-            <a:ext cx="3051393" cy="2728536"/>
+            <a:off x="8778391" y="2510028"/>
+            <a:ext cx="1751990" cy="1828800"/>
+          </a:xfrm>
+          <a:prstGeom prst="rect">
+            <a:avLst/>
+          </a:prstGeom>
+        </p:spPr>
+      </p:pic>
+    </p:spTree>
+    <p:extLst>
+      <p:ext uri="{BB962C8B-B14F-4D97-AF65-F5344CB8AC3E}">
+        <p14:creationId xmlns:p14="http://schemas.microsoft.com/office/powerpoint/2010/main" val="2391933161"/>
+      </p:ext>
+    </p:extLst>
+  </p:cSld>
+  <p:clrMapOvr>
+    <a:masterClrMapping/>
+  </p:clrMapOvr>
+</p:sld>
+</file>
+
+<file path=ppt/slides/slide2.xml><?xml version="1.0" encoding="utf-8"?>
+<p:sld xmlns:a="http://schemas.openxmlformats.org/drawingml/2006/main" xmlns:r="http://schemas.openxmlformats.org/officeDocument/2006/relationships" xmlns:p="http://schemas.openxmlformats.org/presentationml/2006/main">
+  <p:cSld>
+    <p:bg>
+      <p:bgPr>
+        <a:solidFill>
+          <a:schemeClr val="accent1"/>
+        </a:solidFill>
+        <a:effectLst/>
+      </p:bgPr>
+    </p:bg>
+    <p:spTree>
+      <p:nvGrpSpPr>
+        <p:cNvPr id="1" name=""/>
+        <p:cNvGrpSpPr/>
+        <p:nvPr/>
+      </p:nvGrpSpPr>
+      <p:grpSpPr>
+        <a:xfrm>
+          <a:off x="0" y="0"/>
+          <a:ext cx="0" cy="0"/>
+          <a:chOff x="0" y="0"/>
+          <a:chExt cx="0" cy="0"/>
+        </a:xfrm>
+      </p:grpSpPr>
+      <p:sp useBgFill="1">
+        <p:nvSpPr>
+          <p:cNvPr id="19" name="Rectangle 18">
+            <a:extLst>
+              <a:ext uri="{FF2B5EF4-FFF2-40B4-BE49-F238E27FC236}">
+                <a16:creationId xmlns:a16="http://schemas.microsoft.com/office/drawing/2014/main" id="{2A0E4E09-FC02-4ADC-951A-3FFA90B6FE39}"/>
+              </a:ext>
+              <a:ext uri="{C183D7F6-B498-43B3-948B-1728B52AA6E4}">
+                <adec:decorative xmlns:adec="http://schemas.microsoft.com/office/drawing/2017/decorative" val="1"/>
+              </a:ext>
+            </a:extLst>
+          </p:cNvPr>
+          <p:cNvSpPr>
+            <a:spLocks noGrp="1" noRot="1" noChangeAspect="1" noMove="1" noResize="1" noEditPoints="1" noAdjustHandles="1" noChangeArrowheads="1" noChangeShapeType="1" noTextEdit="1"/>
+          </p:cNvSpPr>
+          <p:nvPr>
+            <p:extLst>
+              <p:ext uri="{386F3935-93C4-4BCD-93E2-E3B085C9AB24}">
+                <p16:designElem xmlns:p16="http://schemas.microsoft.com/office/powerpoint/2015/main" val="1"/>
+              </p:ext>
+            </p:extLst>
+          </p:nvPr>
+        </p:nvSpPr>
+        <p:spPr>
+          <a:xfrm>
+            <a:off x="0" y="0"/>
+            <a:ext cx="12191695" cy="6858000"/>
+          </a:xfrm>
+          <a:prstGeom prst="rect">
+            <a:avLst/>
+          </a:prstGeom>
+          <a:ln>
+            <a:noFill/>
+          </a:ln>
+        </p:spPr>
+        <p:style>
+          <a:lnRef idx="2">
+            <a:schemeClr val="accent1">
+              <a:shade val="50000"/>
+            </a:schemeClr>
+          </a:lnRef>
+          <a:fillRef idx="1">
+            <a:schemeClr val="accent1"/>
+          </a:fillRef>
+          <a:effectRef idx="0">
+            <a:schemeClr val="accent1"/>
+          </a:effectRef>
+          <a:fontRef idx="minor">
+            <a:schemeClr val="lt1"/>
+          </a:fontRef>
+        </p:style>
+        <p:txBody>
+          <a:bodyPr rtlCol="0" anchor="ctr"/>
+          <a:lstStyle/>
+          <a:p>
+            <a:pPr algn="ctr"/>
+            <a:endParaRPr lang="en-US"/>
+          </a:p>
+        </p:txBody>
+      </p:sp>
+      <p:sp>
+        <p:nvSpPr>
+          <p:cNvPr id="2" name="Title 1">
+            <a:extLst>
+              <a:ext uri="{FF2B5EF4-FFF2-40B4-BE49-F238E27FC236}">
+                <a16:creationId xmlns:a16="http://schemas.microsoft.com/office/drawing/2014/main" id="{A4168FF9-3F52-4F30-9F57-324B0195FBD7}"/>
+              </a:ext>
+            </a:extLst>
+          </p:cNvPr>
+          <p:cNvSpPr>
+            <a:spLocks noGrp="1"/>
+          </p:cNvSpPr>
+          <p:nvPr>
+            <p:ph type="ctrTitle"/>
+          </p:nvPr>
+        </p:nvSpPr>
+        <p:spPr>
+          <a:xfrm>
+            <a:off x="6286379" y="914400"/>
+            <a:ext cx="3944299" cy="4558748"/>
           </a:xfrm>
         </p:spPr>
         <p:txBody>
-          <a:bodyPr anchor="ctr">
+          <a:bodyPr anchor="b">
             <a:normAutofit/>
           </a:bodyPr>
           <a:lstStyle/>
           <a:p>
-            <a:pPr algn="ctr"/>
-            <a:r>
-              <a:rPr lang="en-GB" sz="3200" dirty="0">
+            <a:r>
+              <a:rPr lang="en-US" sz="4800" u="sng" dirty="0">
                 <a:solidFill>
-                  <a:srgbClr val="FFFFFF"/>
+                  <a:schemeClr val="tx1"/>
                 </a:solidFill>
               </a:rPr>
-              <a:t>Clean Code tips</a:t>
-            </a:r>
-            <a:endParaRPr lang="en-US" sz="3200" dirty="0">
-              <a:solidFill>
-                <a:srgbClr val="FFFFFF"/>
-              </a:solidFill>
-            </a:endParaRPr>
+              <a:t>Clean Code tip</a:t>
+            </a:r>
+            <a:br>
+              <a:rPr lang="en-US" sz="6100" u="sng" dirty="0">
+                <a:solidFill>
+                  <a:schemeClr val="tx1"/>
+                </a:solidFill>
+              </a:rPr>
+            </a:br>
+            <a:br>
+              <a:rPr lang="en-US" sz="6100" dirty="0">
+                <a:solidFill>
+                  <a:schemeClr val="tx1"/>
+                </a:solidFill>
+              </a:rPr>
+            </a:br>
+            <a:r>
+              <a:rPr lang="en-US" sz="6100" dirty="0">
+                <a:solidFill>
+                  <a:schemeClr val="tx1"/>
+                </a:solidFill>
+              </a:rPr>
+              <a:t>Arrange, assert, </a:t>
+            </a:r>
+            <a:br>
+              <a:rPr lang="en-US" sz="6100" dirty="0">
+                <a:solidFill>
+                  <a:schemeClr val="tx1"/>
+                </a:solidFill>
+              </a:rPr>
+            </a:br>
+            <a:r>
+              <a:rPr lang="en-US" sz="6100" dirty="0">
+                <a:solidFill>
+                  <a:schemeClr val="tx1"/>
+                </a:solidFill>
+              </a:rPr>
+              <a:t>Act</a:t>
+            </a:r>
+          </a:p>
+        </p:txBody>
+      </p:sp>
+      <p:sp>
+        <p:nvSpPr>
+          <p:cNvPr id="21" name="Freeform: Shape 20">
+            <a:extLst>
+              <a:ext uri="{FF2B5EF4-FFF2-40B4-BE49-F238E27FC236}">
+                <a16:creationId xmlns:a16="http://schemas.microsoft.com/office/drawing/2014/main" id="{14A1598B-1957-47CF-AAF4-F7A36DA0E7CB}"/>
+              </a:ext>
+              <a:ext uri="{C183D7F6-B498-43B3-948B-1728B52AA6E4}">
+                <adec:decorative xmlns:adec="http://schemas.microsoft.com/office/drawing/2017/decorative" val="1"/>
+              </a:ext>
+            </a:extLst>
+          </p:cNvPr>
+          <p:cNvSpPr>
+            <a:spLocks noGrp="1" noRot="1" noChangeAspect="1" noMove="1" noResize="1" noEditPoints="1" noAdjustHandles="1" noChangeArrowheads="1" noChangeShapeType="1" noTextEdit="1"/>
+          </p:cNvSpPr>
+          <p:nvPr>
+            <p:extLst>
+              <p:ext uri="{386F3935-93C4-4BCD-93E2-E3B085C9AB24}">
+                <p16:designElem xmlns:p16="http://schemas.microsoft.com/office/powerpoint/2015/main" val="1"/>
+              </p:ext>
+            </p:extLst>
+          </p:nvPr>
+        </p:nvSpPr>
+        <p:spPr>
+          <a:xfrm>
+            <a:off x="2" y="3"/>
+            <a:ext cx="6095695" cy="6857997"/>
+          </a:xfrm>
+          <a:custGeom>
+            <a:avLst/>
+            <a:gdLst>
+              <a:gd name="connsiteX0" fmla="*/ 3435036 w 6095695"/>
+              <a:gd name="connsiteY0" fmla="*/ 0 h 6857997"/>
+              <a:gd name="connsiteX1" fmla="*/ 4198562 w 6095695"/>
+              <a:gd name="connsiteY1" fmla="*/ 0 h 6857997"/>
+              <a:gd name="connsiteX2" fmla="*/ 4365987 w 6095695"/>
+              <a:gd name="connsiteY2" fmla="*/ 128761 h 6857997"/>
+              <a:gd name="connsiteX3" fmla="*/ 6095695 w 6095695"/>
+              <a:gd name="connsiteY3" fmla="*/ 3718209 h 6857997"/>
+              <a:gd name="connsiteX4" fmla="*/ 4860911 w 6095695"/>
+              <a:gd name="connsiteY4" fmla="*/ 6845880 h 6857997"/>
+              <a:gd name="connsiteX5" fmla="*/ 4849107 w 6095695"/>
+              <a:gd name="connsiteY5" fmla="*/ 6857997 h 6857997"/>
+              <a:gd name="connsiteX6" fmla="*/ 4253869 w 6095695"/>
+              <a:gd name="connsiteY6" fmla="*/ 6857997 h 6857997"/>
+              <a:gd name="connsiteX7" fmla="*/ 4409441 w 6095695"/>
+              <a:gd name="connsiteY7" fmla="*/ 6719623 h 6857997"/>
+              <a:gd name="connsiteX8" fmla="*/ 5679794 w 6095695"/>
+              <a:gd name="connsiteY8" fmla="*/ 3718209 h 6857997"/>
+              <a:gd name="connsiteX9" fmla="*/ 3591563 w 6095695"/>
+              <a:gd name="connsiteY9" fmla="*/ 88079 h 6857997"/>
+              <a:gd name="connsiteX10" fmla="*/ 0 w 6095695"/>
+              <a:gd name="connsiteY10" fmla="*/ 0 h 6857997"/>
+              <a:gd name="connsiteX11" fmla="*/ 3177466 w 6095695"/>
+              <a:gd name="connsiteY11" fmla="*/ 0 h 6857997"/>
+              <a:gd name="connsiteX12" fmla="*/ 3353291 w 6095695"/>
+              <a:gd name="connsiteY12" fmla="*/ 88129 h 6857997"/>
+              <a:gd name="connsiteX13" fmla="*/ 5560965 w 6095695"/>
+              <a:gd name="connsiteY13" fmla="*/ 3718209 h 6857997"/>
+              <a:gd name="connsiteX14" fmla="*/ 4325417 w 6095695"/>
+              <a:gd name="connsiteY14" fmla="*/ 6637392 h 6857997"/>
+              <a:gd name="connsiteX15" fmla="*/ 4077394 w 6095695"/>
+              <a:gd name="connsiteY15" fmla="*/ 6857997 h 6857997"/>
+              <a:gd name="connsiteX16" fmla="*/ 0 w 6095695"/>
+              <a:gd name="connsiteY16" fmla="*/ 6857997 h 6857997"/>
+            </a:gdLst>
+            <a:ahLst/>
+            <a:cxnLst>
+              <a:cxn ang="0">
+                <a:pos x="connsiteX0" y="connsiteY0"/>
+              </a:cxn>
+              <a:cxn ang="0">
+                <a:pos x="connsiteX1" y="connsiteY1"/>
+              </a:cxn>
+              <a:cxn ang="0">
+                <a:pos x="connsiteX2" y="connsiteY2"/>
+              </a:cxn>
+              <a:cxn ang="0">
+                <a:pos x="connsiteX3" y="connsiteY3"/>
+              </a:cxn>
+              <a:cxn ang="0">
+                <a:pos x="connsiteX4" y="connsiteY4"/>
+              </a:cxn>
+              <a:cxn ang="0">
+                <a:pos x="connsiteX5" y="connsiteY5"/>
+              </a:cxn>
+              <a:cxn ang="0">
+                <a:pos x="connsiteX6" y="connsiteY6"/>
+              </a:cxn>
+              <a:cxn ang="0">
+                <a:pos x="connsiteX7" y="connsiteY7"/>
+              </a:cxn>
+              <a:cxn ang="0">
+                <a:pos x="connsiteX8" y="connsiteY8"/>
+              </a:cxn>
+              <a:cxn ang="0">
+                <a:pos x="connsiteX9" y="connsiteY9"/>
+              </a:cxn>
+              <a:cxn ang="0">
+                <a:pos x="connsiteX10" y="connsiteY10"/>
+              </a:cxn>
+              <a:cxn ang="0">
+                <a:pos x="connsiteX11" y="connsiteY11"/>
+              </a:cxn>
+              <a:cxn ang="0">
+                <a:pos x="connsiteX12" y="connsiteY12"/>
+              </a:cxn>
+              <a:cxn ang="0">
+                <a:pos x="connsiteX13" y="connsiteY13"/>
+              </a:cxn>
+              <a:cxn ang="0">
+                <a:pos x="connsiteX14" y="connsiteY14"/>
+              </a:cxn>
+              <a:cxn ang="0">
+                <a:pos x="connsiteX15" y="connsiteY15"/>
+              </a:cxn>
+              <a:cxn ang="0">
+                <a:pos x="connsiteX16" y="connsiteY16"/>
+              </a:cxn>
+            </a:cxnLst>
+            <a:rect l="l" t="t" r="r" b="b"/>
+            <a:pathLst>
+              <a:path w="6095695" h="6857997">
+                <a:moveTo>
+                  <a:pt x="3435036" y="0"/>
+                </a:moveTo>
+                <a:lnTo>
+                  <a:pt x="4198562" y="0"/>
+                </a:lnTo>
+                <a:lnTo>
+                  <a:pt x="4365987" y="128761"/>
+                </a:lnTo>
+                <a:cubicBezTo>
+                  <a:pt x="5422363" y="981944"/>
+                  <a:pt x="6095695" y="2273123"/>
+                  <a:pt x="6095695" y="3718209"/>
+                </a:cubicBezTo>
+                <a:cubicBezTo>
+                  <a:pt x="6095695" y="4922447"/>
+                  <a:pt x="5628104" y="6019805"/>
+                  <a:pt x="4860911" y="6845880"/>
+                </a:cubicBezTo>
+                <a:lnTo>
+                  <a:pt x="4849107" y="6857997"/>
+                </a:lnTo>
+                <a:lnTo>
+                  <a:pt x="4253869" y="6857997"/>
+                </a:lnTo>
+                <a:lnTo>
+                  <a:pt x="4409441" y="6719623"/>
+                </a:lnTo>
+                <a:cubicBezTo>
+                  <a:pt x="5194330" y="5951494"/>
+                  <a:pt x="5679794" y="4890334"/>
+                  <a:pt x="5679794" y="3718209"/>
+                </a:cubicBezTo>
+                <a:cubicBezTo>
+                  <a:pt x="5679794" y="2179795"/>
+                  <a:pt x="4843506" y="832535"/>
+                  <a:pt x="3591563" y="88079"/>
+                </a:cubicBezTo>
+                <a:close/>
+                <a:moveTo>
+                  <a:pt x="0" y="0"/>
+                </a:moveTo>
+                <a:lnTo>
+                  <a:pt x="3177466" y="0"/>
+                </a:lnTo>
+                <a:lnTo>
+                  <a:pt x="3353291" y="88129"/>
+                </a:lnTo>
+                <a:cubicBezTo>
+                  <a:pt x="4668281" y="787221"/>
+                  <a:pt x="5560965" y="2150692"/>
+                  <a:pt x="5560965" y="3718209"/>
+                </a:cubicBezTo>
+                <a:cubicBezTo>
+                  <a:pt x="5560965" y="4858221"/>
+                  <a:pt x="5088802" y="5890308"/>
+                  <a:pt x="4325417" y="6637392"/>
+                </a:cubicBezTo>
+                <a:lnTo>
+                  <a:pt x="4077394" y="6857997"/>
+                </a:lnTo>
+                <a:lnTo>
+                  <a:pt x="0" y="6857997"/>
+                </a:lnTo>
+                <a:close/>
+              </a:path>
+            </a:pathLst>
+          </a:custGeom>
+          <a:solidFill>
+            <a:schemeClr val="tx1"/>
+          </a:solidFill>
+          <a:ln>
+            <a:noFill/>
+          </a:ln>
+        </p:spPr>
+        <p:style>
+          <a:lnRef idx="2">
+            <a:schemeClr val="accent1">
+              <a:shade val="50000"/>
+            </a:schemeClr>
+          </a:lnRef>
+          <a:fillRef idx="1">
+            <a:schemeClr val="accent1"/>
+          </a:fillRef>
+          <a:effectRef idx="0">
+            <a:schemeClr val="accent1"/>
+          </a:effectRef>
+          <a:fontRef idx="minor">
+            <a:schemeClr val="lt1"/>
+          </a:fontRef>
+        </p:style>
+        <p:txBody>
+          <a:bodyPr wrap="square" rtlCol="0" anchor="ctr">
+            <a:noAutofit/>
+          </a:bodyPr>
+          <a:lstStyle/>
+          <a:p>
+            <a:pPr algn="ctr"/>
+            <a:endParaRPr lang="en-US"/>
           </a:p>
         </p:txBody>
       </p:sp>
@@ -4732,7 +4974,7 @@
           <p:nvPr/>
         </p:nvPicPr>
         <p:blipFill>
-          <a:blip r:embed="rId6">
+          <a:blip r:embed="rId2">
             <a:extLst>
               <a:ext uri="{28A0092B-C50C-407E-A947-70E740481C1C}">
                 <a14:useLocalDpi xmlns:a14="http://schemas.microsoft.com/office/drawing/2010/main" val="0"/>
@@ -4745,8 +4987,8 @@
         </p:blipFill>
         <p:spPr>
           <a:xfrm>
-            <a:off x="1368436" y="4400725"/>
-            <a:ext cx="821077" cy="857074"/>
+            <a:off x="827049" y="1526651"/>
+            <a:ext cx="3644900" cy="3804698"/>
           </a:xfrm>
           <a:prstGeom prst="rect">
             <a:avLst/>
@@ -4761,7 +5003,7 @@
     </p:extLst>
   </p:cSld>
   <p:clrMapOvr>
-    <a:masterClrMapping/>
+    <a:overrideClrMapping bg1="dk1" tx1="lt1" bg2="dk2" tx2="lt2" accent1="accent1" accent2="accent2" accent3="accent3" accent4="accent4" accent5="accent5" accent6="accent6" hlink="hlink" folHlink="folHlink"/>
   </p:clrMapOvr>
 </p:sld>
 </file>

</xml_diff>

<commit_message>
[OK] C# Tip: How to temporarily change the CurrentCulture (#261)
* Added cover image, completed article

* Minor change

Co-authored-by: Davide Bellone <davide.bellone>
</commit_message>
<xml_diff>
--- a/layout-cover-tips.pptx
+++ b/layout-cover-tips.pptx
@@ -516,7 +516,7 @@
           <a:p>
             <a:fld id="{8EDD969E-CD30-4974-94D4-028BE01ED462}" type="datetimeFigureOut">
               <a:rPr lang="en-US" smtClean="0"/>
-              <a:t>2/21/2022</a:t>
+              <a:t>3/4/2022</a:t>
             </a:fld>
             <a:endParaRPr lang="en-US"/>
           </a:p>
@@ -695,7 +695,7 @@
           <a:p>
             <a:fld id="{8EDD969E-CD30-4974-94D4-028BE01ED462}" type="datetimeFigureOut">
               <a:rPr lang="en-US" smtClean="0"/>
-              <a:t>2/21/2022</a:t>
+              <a:t>3/4/2022</a:t>
             </a:fld>
             <a:endParaRPr lang="en-US"/>
           </a:p>
@@ -875,7 +875,7 @@
           <a:p>
             <a:fld id="{8EDD969E-CD30-4974-94D4-028BE01ED462}" type="datetimeFigureOut">
               <a:rPr lang="en-US" smtClean="0"/>
-              <a:t>2/21/2022</a:t>
+              <a:t>3/4/2022</a:t>
             </a:fld>
             <a:endParaRPr lang="en-US"/>
           </a:p>
@@ -1045,7 +1045,7 @@
           <a:p>
             <a:fld id="{8EDD969E-CD30-4974-94D4-028BE01ED462}" type="datetimeFigureOut">
               <a:rPr lang="en-US" smtClean="0"/>
-              <a:t>2/21/2022</a:t>
+              <a:t>3/4/2022</a:t>
             </a:fld>
             <a:endParaRPr lang="en-US"/>
           </a:p>
@@ -1358,7 +1358,7 @@
           <a:p>
             <a:fld id="{8EDD969E-CD30-4974-94D4-028BE01ED462}" type="datetimeFigureOut">
               <a:rPr lang="en-US" smtClean="0"/>
-              <a:t>2/21/2022</a:t>
+              <a:t>3/4/2022</a:t>
             </a:fld>
             <a:endParaRPr lang="en-US"/>
           </a:p>
@@ -1744,7 +1744,7 @@
           <a:p>
             <a:fld id="{8EDD969E-CD30-4974-94D4-028BE01ED462}" type="datetimeFigureOut">
               <a:rPr lang="en-US" smtClean="0"/>
-              <a:t>2/21/2022</a:t>
+              <a:t>3/4/2022</a:t>
             </a:fld>
             <a:endParaRPr lang="en-US"/>
           </a:p>
@@ -2178,7 +2178,7 @@
           <a:p>
             <a:fld id="{8EDD969E-CD30-4974-94D4-028BE01ED462}" type="datetimeFigureOut">
               <a:rPr lang="en-US" smtClean="0"/>
-              <a:t>2/21/2022</a:t>
+              <a:t>3/4/2022</a:t>
             </a:fld>
             <a:endParaRPr lang="en-US"/>
           </a:p>
@@ -2296,7 +2296,7 @@
           <a:p>
             <a:fld id="{8EDD969E-CD30-4974-94D4-028BE01ED462}" type="datetimeFigureOut">
               <a:rPr lang="en-US" smtClean="0"/>
-              <a:t>2/21/2022</a:t>
+              <a:t>3/4/2022</a:t>
             </a:fld>
             <a:endParaRPr lang="en-US"/>
           </a:p>
@@ -2391,7 +2391,7 @@
           <a:p>
             <a:fld id="{8EDD969E-CD30-4974-94D4-028BE01ED462}" type="datetimeFigureOut">
               <a:rPr lang="en-US" smtClean="0"/>
-              <a:t>2/21/2022</a:t>
+              <a:t>3/4/2022</a:t>
             </a:fld>
             <a:endParaRPr lang="en-US"/>
           </a:p>
@@ -2741,7 +2741,7 @@
           <a:p>
             <a:fld id="{8EDD969E-CD30-4974-94D4-028BE01ED462}" type="datetimeFigureOut">
               <a:rPr lang="en-US" smtClean="0"/>
-              <a:t>2/21/2022</a:t>
+              <a:t>3/4/2022</a:t>
             </a:fld>
             <a:endParaRPr lang="en-US"/>
           </a:p>
@@ -3166,7 +3166,7 @@
           <a:p>
             <a:fld id="{8EDD969E-CD30-4974-94D4-028BE01ED462}" type="datetimeFigureOut">
               <a:rPr lang="en-US" smtClean="0"/>
-              <a:t>2/21/2022</a:t>
+              <a:t>3/4/2022</a:t>
             </a:fld>
             <a:endParaRPr lang="en-US"/>
           </a:p>
@@ -3452,7 +3452,7 @@
           <a:p>
             <a:fld id="{8EDD969E-CD30-4974-94D4-028BE01ED462}" type="datetimeFigureOut">
               <a:rPr lang="en-US" smtClean="0"/>
-              <a:t>2/21/2022</a:t>
+              <a:t>3/4/2022</a:t>
             </a:fld>
             <a:endParaRPr lang="en-US"/>
           </a:p>
@@ -4235,8 +4235,8 @@
         </p:nvSpPr>
         <p:spPr>
           <a:xfrm>
-            <a:off x="643467" y="1673352"/>
-            <a:ext cx="6516241" cy="3849020"/>
+            <a:off x="1433146" y="1673352"/>
+            <a:ext cx="5726562" cy="3849020"/>
           </a:xfrm>
         </p:spPr>
         <p:txBody>
@@ -4257,24 +4257,24 @@
               <a:rPr lang="en-GB" sz="7500" cap="none" dirty="0"/>
             </a:br>
             <a:r>
-              <a:rPr lang="en-GB" sz="7500" i="1" u="sng" cap="none" dirty="0"/>
-              <a:t>when</a:t>
-            </a:r>
-            <a:r>
-              <a:rPr lang="en-GB" sz="7500" cap="none" dirty="0"/>
-              <a:t> + </a:t>
-            </a:r>
-            <a:r>
-              <a:rPr lang="en-GB" sz="7500" i="1" u="sng" cap="none" dirty="0"/>
-              <a:t>catch</a:t>
-            </a:r>
-            <a:r>
-              <a:rPr lang="en-GB" sz="7500" i="1" cap="none" dirty="0"/>
+              <a:rPr lang="en-US" sz="6000" i="1" cap="none" dirty="0"/>
+              <a:t>How to temporarily change the </a:t>
+            </a:r>
+            <a:r>
+              <a:rPr lang="en-US" sz="6000" b="1" i="1" cap="none" dirty="0" err="1"/>
+              <a:t>CurrentCulture</a:t>
+            </a:r>
+            <a:r>
+              <a:rPr lang="en-US" sz="6000" b="1" i="1" cap="none" dirty="0"/>
               <a:t> </a:t>
             </a:r>
             <a:r>
-              <a:rPr lang="en-GB" sz="7500" cap="none" dirty="0"/>
-              <a:t>to handle exceptions gracefully</a:t>
+              <a:rPr lang="en-US" sz="6000" i="1" cap="none" dirty="0"/>
+              <a:t>with </a:t>
+            </a:r>
+            <a:r>
+              <a:rPr lang="en-US" sz="6000" i="1" cap="none" dirty="0" err="1"/>
+              <a:t>IDisposable</a:t>
             </a:r>
             <a:endParaRPr lang="en-US" sz="7500" i="1" cap="none" dirty="0"/>
           </a:p>

</xml_diff>

<commit_message>
[OK] - CC: good comments (#263)
* Created article

* Fixed snippet of code

Co-authored-by: Davide Bellone <davide.bellone>
</commit_message>
<xml_diff>
--- a/layout-cover-tips.pptx
+++ b/layout-cover-tips.pptx
@@ -516,7 +516,7 @@
           <a:p>
             <a:fld id="{8EDD969E-CD30-4974-94D4-028BE01ED462}" type="datetimeFigureOut">
               <a:rPr lang="en-US" smtClean="0"/>
-              <a:t>3/4/2022</a:t>
+              <a:t>3/15/2022</a:t>
             </a:fld>
             <a:endParaRPr lang="en-US"/>
           </a:p>
@@ -695,7 +695,7 @@
           <a:p>
             <a:fld id="{8EDD969E-CD30-4974-94D4-028BE01ED462}" type="datetimeFigureOut">
               <a:rPr lang="en-US" smtClean="0"/>
-              <a:t>3/4/2022</a:t>
+              <a:t>3/15/2022</a:t>
             </a:fld>
             <a:endParaRPr lang="en-US"/>
           </a:p>
@@ -875,7 +875,7 @@
           <a:p>
             <a:fld id="{8EDD969E-CD30-4974-94D4-028BE01ED462}" type="datetimeFigureOut">
               <a:rPr lang="en-US" smtClean="0"/>
-              <a:t>3/4/2022</a:t>
+              <a:t>3/15/2022</a:t>
             </a:fld>
             <a:endParaRPr lang="en-US"/>
           </a:p>
@@ -1045,7 +1045,7 @@
           <a:p>
             <a:fld id="{8EDD969E-CD30-4974-94D4-028BE01ED462}" type="datetimeFigureOut">
               <a:rPr lang="en-US" smtClean="0"/>
-              <a:t>3/4/2022</a:t>
+              <a:t>3/15/2022</a:t>
             </a:fld>
             <a:endParaRPr lang="en-US"/>
           </a:p>
@@ -1358,7 +1358,7 @@
           <a:p>
             <a:fld id="{8EDD969E-CD30-4974-94D4-028BE01ED462}" type="datetimeFigureOut">
               <a:rPr lang="en-US" smtClean="0"/>
-              <a:t>3/4/2022</a:t>
+              <a:t>3/15/2022</a:t>
             </a:fld>
             <a:endParaRPr lang="en-US"/>
           </a:p>
@@ -1744,7 +1744,7 @@
           <a:p>
             <a:fld id="{8EDD969E-CD30-4974-94D4-028BE01ED462}" type="datetimeFigureOut">
               <a:rPr lang="en-US" smtClean="0"/>
-              <a:t>3/4/2022</a:t>
+              <a:t>3/15/2022</a:t>
             </a:fld>
             <a:endParaRPr lang="en-US"/>
           </a:p>
@@ -2178,7 +2178,7 @@
           <a:p>
             <a:fld id="{8EDD969E-CD30-4974-94D4-028BE01ED462}" type="datetimeFigureOut">
               <a:rPr lang="en-US" smtClean="0"/>
-              <a:t>3/4/2022</a:t>
+              <a:t>3/15/2022</a:t>
             </a:fld>
             <a:endParaRPr lang="en-US"/>
           </a:p>
@@ -2296,7 +2296,7 @@
           <a:p>
             <a:fld id="{8EDD969E-CD30-4974-94D4-028BE01ED462}" type="datetimeFigureOut">
               <a:rPr lang="en-US" smtClean="0"/>
-              <a:t>3/4/2022</a:t>
+              <a:t>3/15/2022</a:t>
             </a:fld>
             <a:endParaRPr lang="en-US"/>
           </a:p>
@@ -2391,7 +2391,7 @@
           <a:p>
             <a:fld id="{8EDD969E-CD30-4974-94D4-028BE01ED462}" type="datetimeFigureOut">
               <a:rPr lang="en-US" smtClean="0"/>
-              <a:t>3/4/2022</a:t>
+              <a:t>3/15/2022</a:t>
             </a:fld>
             <a:endParaRPr lang="en-US"/>
           </a:p>
@@ -2741,7 +2741,7 @@
           <a:p>
             <a:fld id="{8EDD969E-CD30-4974-94D4-028BE01ED462}" type="datetimeFigureOut">
               <a:rPr lang="en-US" smtClean="0"/>
-              <a:t>3/4/2022</a:t>
+              <a:t>3/15/2022</a:t>
             </a:fld>
             <a:endParaRPr lang="en-US"/>
           </a:p>
@@ -3166,7 +3166,7 @@
           <a:p>
             <a:fld id="{8EDD969E-CD30-4974-94D4-028BE01ED462}" type="datetimeFigureOut">
               <a:rPr lang="en-US" smtClean="0"/>
-              <a:t>3/4/2022</a:t>
+              <a:t>3/15/2022</a:t>
             </a:fld>
             <a:endParaRPr lang="en-US"/>
           </a:p>
@@ -3452,7 +3452,7 @@
           <a:p>
             <a:fld id="{8EDD969E-CD30-4974-94D4-028BE01ED462}" type="datetimeFigureOut">
               <a:rPr lang="en-US" smtClean="0"/>
-              <a:t>3/4/2022</a:t>
+              <a:t>3/15/2022</a:t>
             </a:fld>
             <a:endParaRPr lang="en-US"/>
           </a:p>
@@ -4714,23 +4714,21 @@
                   <a:schemeClr val="tx1"/>
                 </a:solidFill>
               </a:rPr>
-              <a:t>Arrange, assert, </a:t>
-            </a:r>
-            <a:br>
-              <a:rPr lang="en-US" sz="6100" dirty="0">
+              <a:t>Not all comments </a:t>
+            </a:r>
+            <a:r>
+              <a:rPr lang="en-US" sz="6100">
                 <a:solidFill>
                   <a:schemeClr val="tx1"/>
                 </a:solidFill>
               </a:rPr>
-            </a:br>
-            <a:r>
-              <a:rPr lang="en-US" sz="6100" dirty="0">
-                <a:solidFill>
-                  <a:schemeClr val="tx1"/>
-                </a:solidFill>
-              </a:rPr>
-              <a:t>Act</a:t>
-            </a:r>
+              <a:t>are bad</a:t>
+            </a:r>
+            <a:endParaRPr lang="en-US" sz="6100" dirty="0">
+              <a:solidFill>
+                <a:schemeClr val="tx1"/>
+              </a:solidFill>
+            </a:endParaRPr>
           </a:p>
         </p:txBody>
       </p:sp>

</xml_diff>

<commit_message>
[OK] Cstip Expandoobject dictionary (#273)
* Created draft article

* Completed article

Co-authored-by: Davide Bellone <davide.bellone>
</commit_message>
<xml_diff>
--- a/layout-cover-tips.pptx
+++ b/layout-cover-tips.pptx
@@ -516,7 +516,7 @@
           <a:p>
             <a:fld id="{8EDD969E-CD30-4974-94D4-028BE01ED462}" type="datetimeFigureOut">
               <a:rPr lang="en-US" smtClean="0"/>
-              <a:t>4/12/2022</a:t>
+              <a:t>5/9/2022</a:t>
             </a:fld>
             <a:endParaRPr lang="en-US"/>
           </a:p>
@@ -695,7 +695,7 @@
           <a:p>
             <a:fld id="{8EDD969E-CD30-4974-94D4-028BE01ED462}" type="datetimeFigureOut">
               <a:rPr lang="en-US" smtClean="0"/>
-              <a:t>4/12/2022</a:t>
+              <a:t>5/9/2022</a:t>
             </a:fld>
             <a:endParaRPr lang="en-US"/>
           </a:p>
@@ -875,7 +875,7 @@
           <a:p>
             <a:fld id="{8EDD969E-CD30-4974-94D4-028BE01ED462}" type="datetimeFigureOut">
               <a:rPr lang="en-US" smtClean="0"/>
-              <a:t>4/12/2022</a:t>
+              <a:t>5/9/2022</a:t>
             </a:fld>
             <a:endParaRPr lang="en-US"/>
           </a:p>
@@ -1045,7 +1045,7 @@
           <a:p>
             <a:fld id="{8EDD969E-CD30-4974-94D4-028BE01ED462}" type="datetimeFigureOut">
               <a:rPr lang="en-US" smtClean="0"/>
-              <a:t>4/12/2022</a:t>
+              <a:t>5/9/2022</a:t>
             </a:fld>
             <a:endParaRPr lang="en-US"/>
           </a:p>
@@ -1358,7 +1358,7 @@
           <a:p>
             <a:fld id="{8EDD969E-CD30-4974-94D4-028BE01ED462}" type="datetimeFigureOut">
               <a:rPr lang="en-US" smtClean="0"/>
-              <a:t>4/12/2022</a:t>
+              <a:t>5/9/2022</a:t>
             </a:fld>
             <a:endParaRPr lang="en-US"/>
           </a:p>
@@ -1744,7 +1744,7 @@
           <a:p>
             <a:fld id="{8EDD969E-CD30-4974-94D4-028BE01ED462}" type="datetimeFigureOut">
               <a:rPr lang="en-US" smtClean="0"/>
-              <a:t>4/12/2022</a:t>
+              <a:t>5/9/2022</a:t>
             </a:fld>
             <a:endParaRPr lang="en-US"/>
           </a:p>
@@ -2178,7 +2178,7 @@
           <a:p>
             <a:fld id="{8EDD969E-CD30-4974-94D4-028BE01ED462}" type="datetimeFigureOut">
               <a:rPr lang="en-US" smtClean="0"/>
-              <a:t>4/12/2022</a:t>
+              <a:t>5/9/2022</a:t>
             </a:fld>
             <a:endParaRPr lang="en-US"/>
           </a:p>
@@ -2296,7 +2296,7 @@
           <a:p>
             <a:fld id="{8EDD969E-CD30-4974-94D4-028BE01ED462}" type="datetimeFigureOut">
               <a:rPr lang="en-US" smtClean="0"/>
-              <a:t>4/12/2022</a:t>
+              <a:t>5/9/2022</a:t>
             </a:fld>
             <a:endParaRPr lang="en-US"/>
           </a:p>
@@ -2391,7 +2391,7 @@
           <a:p>
             <a:fld id="{8EDD969E-CD30-4974-94D4-028BE01ED462}" type="datetimeFigureOut">
               <a:rPr lang="en-US" smtClean="0"/>
-              <a:t>4/12/2022</a:t>
+              <a:t>5/9/2022</a:t>
             </a:fld>
             <a:endParaRPr lang="en-US"/>
           </a:p>
@@ -2741,7 +2741,7 @@
           <a:p>
             <a:fld id="{8EDD969E-CD30-4974-94D4-028BE01ED462}" type="datetimeFigureOut">
               <a:rPr lang="en-US" smtClean="0"/>
-              <a:t>4/12/2022</a:t>
+              <a:t>5/9/2022</a:t>
             </a:fld>
             <a:endParaRPr lang="en-US"/>
           </a:p>
@@ -3166,7 +3166,7 @@
           <a:p>
             <a:fld id="{8EDD969E-CD30-4974-94D4-028BE01ED462}" type="datetimeFigureOut">
               <a:rPr lang="en-US" smtClean="0"/>
-              <a:t>4/12/2022</a:t>
+              <a:t>5/9/2022</a:t>
             </a:fld>
             <a:endParaRPr lang="en-US"/>
           </a:p>
@@ -3452,7 +3452,7 @@
           <a:p>
             <a:fld id="{8EDD969E-CD30-4974-94D4-028BE01ED462}" type="datetimeFigureOut">
               <a:rPr lang="en-US" smtClean="0"/>
-              <a:t>4/12/2022</a:t>
+              <a:t>5/9/2022</a:t>
             </a:fld>
             <a:endParaRPr lang="en-US"/>
           </a:p>
@@ -4241,7 +4241,7 @@
         </p:spPr>
         <p:txBody>
           <a:bodyPr anchor="b">
-            <a:normAutofit fontScale="90000"/>
+            <a:normAutofit/>
           </a:bodyPr>
           <a:lstStyle/>
           <a:p>
@@ -4258,7 +4258,7 @@
             </a:br>
             <a:r>
               <a:rPr lang="en-US" sz="6000" b="1" i="1" cap="none" dirty="0" err="1"/>
-              <a:t>Debug.Assert</a:t>
+              <a:t>ExpandoObject</a:t>
             </a:r>
             <a:r>
               <a:rPr lang="en-US" sz="6000" b="1" i="1" cap="none" dirty="0"/>
@@ -4266,7 +4266,15 @@
             </a:r>
             <a:r>
               <a:rPr lang="en-US" sz="6000" cap="none" dirty="0"/>
-              <a:t>to break debugging flow when a condition fails</a:t>
+              <a:t>to</a:t>
+            </a:r>
+            <a:r>
+              <a:rPr lang="en-US" sz="6000" b="1" i="1" cap="none" dirty="0"/>
+              <a:t> </a:t>
+            </a:r>
+            <a:r>
+              <a:rPr lang="en-US" sz="6000" b="1" i="1" cap="none" dirty="0" err="1"/>
+              <a:t>IDictionary</a:t>
             </a:r>
             <a:endParaRPr lang="en-US" sz="7500" cap="none" dirty="0"/>
           </a:p>

</xml_diff>

<commit_message>
[OK]  CC tip: Tests should be even more well-written than production code (#275)
* Created article

* Added alt text

Co-authored-by: Davide Bellone <davide.bellone>
</commit_message>
<xml_diff>
--- a/layout-cover-tips.pptx
+++ b/layout-cover-tips.pptx
@@ -516,7 +516,7 @@
           <a:p>
             <a:fld id="{8EDD969E-CD30-4974-94D4-028BE01ED462}" type="datetimeFigureOut">
               <a:rPr lang="en-US" smtClean="0"/>
-              <a:t>5/9/2022</a:t>
+              <a:t>5/18/2022</a:t>
             </a:fld>
             <a:endParaRPr lang="en-US"/>
           </a:p>
@@ -695,7 +695,7 @@
           <a:p>
             <a:fld id="{8EDD969E-CD30-4974-94D4-028BE01ED462}" type="datetimeFigureOut">
               <a:rPr lang="en-US" smtClean="0"/>
-              <a:t>5/9/2022</a:t>
+              <a:t>5/18/2022</a:t>
             </a:fld>
             <a:endParaRPr lang="en-US"/>
           </a:p>
@@ -875,7 +875,7 @@
           <a:p>
             <a:fld id="{8EDD969E-CD30-4974-94D4-028BE01ED462}" type="datetimeFigureOut">
               <a:rPr lang="en-US" smtClean="0"/>
-              <a:t>5/9/2022</a:t>
+              <a:t>5/18/2022</a:t>
             </a:fld>
             <a:endParaRPr lang="en-US"/>
           </a:p>
@@ -1045,7 +1045,7 @@
           <a:p>
             <a:fld id="{8EDD969E-CD30-4974-94D4-028BE01ED462}" type="datetimeFigureOut">
               <a:rPr lang="en-US" smtClean="0"/>
-              <a:t>5/9/2022</a:t>
+              <a:t>5/18/2022</a:t>
             </a:fld>
             <a:endParaRPr lang="en-US"/>
           </a:p>
@@ -1358,7 +1358,7 @@
           <a:p>
             <a:fld id="{8EDD969E-CD30-4974-94D4-028BE01ED462}" type="datetimeFigureOut">
               <a:rPr lang="en-US" smtClean="0"/>
-              <a:t>5/9/2022</a:t>
+              <a:t>5/18/2022</a:t>
             </a:fld>
             <a:endParaRPr lang="en-US"/>
           </a:p>
@@ -1744,7 +1744,7 @@
           <a:p>
             <a:fld id="{8EDD969E-CD30-4974-94D4-028BE01ED462}" type="datetimeFigureOut">
               <a:rPr lang="en-US" smtClean="0"/>
-              <a:t>5/9/2022</a:t>
+              <a:t>5/18/2022</a:t>
             </a:fld>
             <a:endParaRPr lang="en-US"/>
           </a:p>
@@ -2178,7 +2178,7 @@
           <a:p>
             <a:fld id="{8EDD969E-CD30-4974-94D4-028BE01ED462}" type="datetimeFigureOut">
               <a:rPr lang="en-US" smtClean="0"/>
-              <a:t>5/9/2022</a:t>
+              <a:t>5/18/2022</a:t>
             </a:fld>
             <a:endParaRPr lang="en-US"/>
           </a:p>
@@ -2296,7 +2296,7 @@
           <a:p>
             <a:fld id="{8EDD969E-CD30-4974-94D4-028BE01ED462}" type="datetimeFigureOut">
               <a:rPr lang="en-US" smtClean="0"/>
-              <a:t>5/9/2022</a:t>
+              <a:t>5/18/2022</a:t>
             </a:fld>
             <a:endParaRPr lang="en-US"/>
           </a:p>
@@ -2391,7 +2391,7 @@
           <a:p>
             <a:fld id="{8EDD969E-CD30-4974-94D4-028BE01ED462}" type="datetimeFigureOut">
               <a:rPr lang="en-US" smtClean="0"/>
-              <a:t>5/9/2022</a:t>
+              <a:t>5/18/2022</a:t>
             </a:fld>
             <a:endParaRPr lang="en-US"/>
           </a:p>
@@ -2741,7 +2741,7 @@
           <a:p>
             <a:fld id="{8EDD969E-CD30-4974-94D4-028BE01ED462}" type="datetimeFigureOut">
               <a:rPr lang="en-US" smtClean="0"/>
-              <a:t>5/9/2022</a:t>
+              <a:t>5/18/2022</a:t>
             </a:fld>
             <a:endParaRPr lang="en-US"/>
           </a:p>
@@ -3166,7 +3166,7 @@
           <a:p>
             <a:fld id="{8EDD969E-CD30-4974-94D4-028BE01ED462}" type="datetimeFigureOut">
               <a:rPr lang="en-US" smtClean="0"/>
-              <a:t>5/9/2022</a:t>
+              <a:t>5/18/2022</a:t>
             </a:fld>
             <a:endParaRPr lang="en-US"/>
           </a:p>
@@ -3452,7 +3452,7 @@
           <a:p>
             <a:fld id="{8EDD969E-CD30-4974-94D4-028BE01ED462}" type="datetimeFigureOut">
               <a:rPr lang="en-US" smtClean="0"/>
-              <a:t>5/9/2022</a:t>
+              <a:t>5/18/2022</a:t>
             </a:fld>
             <a:endParaRPr lang="en-US"/>
           </a:p>
@@ -4687,7 +4687,7 @@
           <a:lstStyle/>
           <a:p>
             <a:r>
-              <a:rPr lang="en-US" sz="4800" u="sng" dirty="0">
+              <a:rPr lang="en-US" sz="3200" u="sng" dirty="0">
                 <a:solidFill>
                   <a:schemeClr val="tx1"/>
                 </a:solidFill>
@@ -4714,16 +4714,13 @@
                   <a:schemeClr val="tx1"/>
                 </a:solidFill>
               </a:rPr>
-              <a:t>Avoid too many </a:t>
-            </a:r>
-            <a:r>
-              <a:rPr lang="en-US" sz="6100" u="sng" dirty="0">
-                <a:solidFill>
-                  <a:schemeClr val="tx1"/>
-                </a:solidFill>
-              </a:rPr>
-              <a:t>imports</a:t>
-            </a:r>
+              <a:t>Tests should be clean too!</a:t>
+            </a:r>
+            <a:endParaRPr lang="en-US" sz="6100" u="sng" dirty="0">
+              <a:solidFill>
+                <a:schemeClr val="tx1"/>
+              </a:solidFill>
+            </a:endParaRPr>
           </a:p>
         </p:txBody>
       </p:sp>

</xml_diff>

<commit_message>
[DRAFT] C# tip: use httpclientfactory (#277)
* Added httpclient article

* Removed old images

* Completed article

Co-authored-by: Davide Bellone <davide.bellone>
</commit_message>
<xml_diff>
--- a/layout-cover-tips.pptx
+++ b/layout-cover-tips.pptx
@@ -516,7 +516,7 @@
           <a:p>
             <a:fld id="{8EDD969E-CD30-4974-94D4-028BE01ED462}" type="datetimeFigureOut">
               <a:rPr lang="en-US" smtClean="0"/>
-              <a:t>5/18/2022</a:t>
+              <a:t>6/6/2022</a:t>
             </a:fld>
             <a:endParaRPr lang="en-US"/>
           </a:p>
@@ -695,7 +695,7 @@
           <a:p>
             <a:fld id="{8EDD969E-CD30-4974-94D4-028BE01ED462}" type="datetimeFigureOut">
               <a:rPr lang="en-US" smtClean="0"/>
-              <a:t>5/18/2022</a:t>
+              <a:t>6/6/2022</a:t>
             </a:fld>
             <a:endParaRPr lang="en-US"/>
           </a:p>
@@ -875,7 +875,7 @@
           <a:p>
             <a:fld id="{8EDD969E-CD30-4974-94D4-028BE01ED462}" type="datetimeFigureOut">
               <a:rPr lang="en-US" smtClean="0"/>
-              <a:t>5/18/2022</a:t>
+              <a:t>6/6/2022</a:t>
             </a:fld>
             <a:endParaRPr lang="en-US"/>
           </a:p>
@@ -1045,7 +1045,7 @@
           <a:p>
             <a:fld id="{8EDD969E-CD30-4974-94D4-028BE01ED462}" type="datetimeFigureOut">
               <a:rPr lang="en-US" smtClean="0"/>
-              <a:t>5/18/2022</a:t>
+              <a:t>6/6/2022</a:t>
             </a:fld>
             <a:endParaRPr lang="en-US"/>
           </a:p>
@@ -1358,7 +1358,7 @@
           <a:p>
             <a:fld id="{8EDD969E-CD30-4974-94D4-028BE01ED462}" type="datetimeFigureOut">
               <a:rPr lang="en-US" smtClean="0"/>
-              <a:t>5/18/2022</a:t>
+              <a:t>6/6/2022</a:t>
             </a:fld>
             <a:endParaRPr lang="en-US"/>
           </a:p>
@@ -1744,7 +1744,7 @@
           <a:p>
             <a:fld id="{8EDD969E-CD30-4974-94D4-028BE01ED462}" type="datetimeFigureOut">
               <a:rPr lang="en-US" smtClean="0"/>
-              <a:t>5/18/2022</a:t>
+              <a:t>6/6/2022</a:t>
             </a:fld>
             <a:endParaRPr lang="en-US"/>
           </a:p>
@@ -2178,7 +2178,7 @@
           <a:p>
             <a:fld id="{8EDD969E-CD30-4974-94D4-028BE01ED462}" type="datetimeFigureOut">
               <a:rPr lang="en-US" smtClean="0"/>
-              <a:t>5/18/2022</a:t>
+              <a:t>6/6/2022</a:t>
             </a:fld>
             <a:endParaRPr lang="en-US"/>
           </a:p>
@@ -2296,7 +2296,7 @@
           <a:p>
             <a:fld id="{8EDD969E-CD30-4974-94D4-028BE01ED462}" type="datetimeFigureOut">
               <a:rPr lang="en-US" smtClean="0"/>
-              <a:t>5/18/2022</a:t>
+              <a:t>6/6/2022</a:t>
             </a:fld>
             <a:endParaRPr lang="en-US"/>
           </a:p>
@@ -2391,7 +2391,7 @@
           <a:p>
             <a:fld id="{8EDD969E-CD30-4974-94D4-028BE01ED462}" type="datetimeFigureOut">
               <a:rPr lang="en-US" smtClean="0"/>
-              <a:t>5/18/2022</a:t>
+              <a:t>6/6/2022</a:t>
             </a:fld>
             <a:endParaRPr lang="en-US"/>
           </a:p>
@@ -2741,7 +2741,7 @@
           <a:p>
             <a:fld id="{8EDD969E-CD30-4974-94D4-028BE01ED462}" type="datetimeFigureOut">
               <a:rPr lang="en-US" smtClean="0"/>
-              <a:t>5/18/2022</a:t>
+              <a:t>6/6/2022</a:t>
             </a:fld>
             <a:endParaRPr lang="en-US"/>
           </a:p>
@@ -3166,7 +3166,7 @@
           <a:p>
             <a:fld id="{8EDD969E-CD30-4974-94D4-028BE01ED462}" type="datetimeFigureOut">
               <a:rPr lang="en-US" smtClean="0"/>
-              <a:t>5/18/2022</a:t>
+              <a:t>6/6/2022</a:t>
             </a:fld>
             <a:endParaRPr lang="en-US"/>
           </a:p>
@@ -3452,7 +3452,7 @@
           <a:p>
             <a:fld id="{8EDD969E-CD30-4974-94D4-028BE01ED462}" type="datetimeFigureOut">
               <a:rPr lang="en-US" smtClean="0"/>
-              <a:t>5/18/2022</a:t>
+              <a:t>6/6/2022</a:t>
             </a:fld>
             <a:endParaRPr lang="en-US"/>
           </a:p>
@@ -4241,7 +4241,7 @@
         </p:spPr>
         <p:txBody>
           <a:bodyPr anchor="b">
-            <a:normAutofit/>
+            <a:normAutofit fontScale="90000"/>
           </a:bodyPr>
           <a:lstStyle/>
           <a:p>
@@ -4257,26 +4257,28 @@
               <a:rPr lang="en-GB" sz="7500" cap="none" dirty="0"/>
             </a:br>
             <a:r>
-              <a:rPr lang="en-US" sz="6000" b="1" i="1" cap="none" dirty="0" err="1"/>
-              <a:t>ExpandoObject</a:t>
+              <a:rPr lang="en-GB" sz="7500" cap="none" dirty="0"/>
+              <a:t>Use</a:t>
             </a:r>
             <a:r>
               <a:rPr lang="en-US" sz="6000" b="1" i="1" cap="none" dirty="0"/>
               <a:t> </a:t>
             </a:r>
             <a:r>
-              <a:rPr lang="en-US" sz="6000" cap="none" dirty="0"/>
-              <a:t>to</a:t>
+              <a:rPr lang="en-US" sz="6000" b="1" i="1" cap="none" dirty="0" err="1"/>
+              <a:t>HttpClientFactory</a:t>
             </a:r>
             <a:r>
               <a:rPr lang="en-US" sz="6000" b="1" i="1" cap="none" dirty="0"/>
               <a:t> </a:t>
             </a:r>
-            <a:r>
-              <a:rPr lang="en-US" sz="6000" b="1" i="1" cap="none" dirty="0" err="1"/>
-              <a:t>IDictionary</a:t>
-            </a:r>
-            <a:endParaRPr lang="en-US" sz="7500" cap="none" dirty="0"/>
+            <a:br>
+              <a:rPr lang="en-US" sz="6000" b="1" i="1" cap="none" dirty="0"/>
+            </a:br>
+            <a:r>
+              <a:rPr lang="en-US" sz="7600" cap="none" dirty="0"/>
+              <a:t>to prevent Socket Exhaustion</a:t>
+            </a:r>
           </a:p>
         </p:txBody>
       </p:sp>

</xml_diff>

<commit_message>
[OK] Cctip/avoid subtle duplication (#279)
* Init article

* Completed article

Co-authored-by: Davide Bellone <davide.bellone>
</commit_message>
<xml_diff>
--- a/layout-cover-tips.pptx
+++ b/layout-cover-tips.pptx
@@ -516,7 +516,7 @@
           <a:p>
             <a:fld id="{8EDD969E-CD30-4974-94D4-028BE01ED462}" type="datetimeFigureOut">
               <a:rPr lang="en-US" smtClean="0"/>
-              <a:t>6/6/2022</a:t>
+              <a:t>6/27/2022</a:t>
             </a:fld>
             <a:endParaRPr lang="en-US"/>
           </a:p>
@@ -695,7 +695,7 @@
           <a:p>
             <a:fld id="{8EDD969E-CD30-4974-94D4-028BE01ED462}" type="datetimeFigureOut">
               <a:rPr lang="en-US" smtClean="0"/>
-              <a:t>6/6/2022</a:t>
+              <a:t>6/27/2022</a:t>
             </a:fld>
             <a:endParaRPr lang="en-US"/>
           </a:p>
@@ -875,7 +875,7 @@
           <a:p>
             <a:fld id="{8EDD969E-CD30-4974-94D4-028BE01ED462}" type="datetimeFigureOut">
               <a:rPr lang="en-US" smtClean="0"/>
-              <a:t>6/6/2022</a:t>
+              <a:t>6/27/2022</a:t>
             </a:fld>
             <a:endParaRPr lang="en-US"/>
           </a:p>
@@ -1045,7 +1045,7 @@
           <a:p>
             <a:fld id="{8EDD969E-CD30-4974-94D4-028BE01ED462}" type="datetimeFigureOut">
               <a:rPr lang="en-US" smtClean="0"/>
-              <a:t>6/6/2022</a:t>
+              <a:t>6/27/2022</a:t>
             </a:fld>
             <a:endParaRPr lang="en-US"/>
           </a:p>
@@ -1358,7 +1358,7 @@
           <a:p>
             <a:fld id="{8EDD969E-CD30-4974-94D4-028BE01ED462}" type="datetimeFigureOut">
               <a:rPr lang="en-US" smtClean="0"/>
-              <a:t>6/6/2022</a:t>
+              <a:t>6/27/2022</a:t>
             </a:fld>
             <a:endParaRPr lang="en-US"/>
           </a:p>
@@ -1744,7 +1744,7 @@
           <a:p>
             <a:fld id="{8EDD969E-CD30-4974-94D4-028BE01ED462}" type="datetimeFigureOut">
               <a:rPr lang="en-US" smtClean="0"/>
-              <a:t>6/6/2022</a:t>
+              <a:t>6/27/2022</a:t>
             </a:fld>
             <a:endParaRPr lang="en-US"/>
           </a:p>
@@ -2178,7 +2178,7 @@
           <a:p>
             <a:fld id="{8EDD969E-CD30-4974-94D4-028BE01ED462}" type="datetimeFigureOut">
               <a:rPr lang="en-US" smtClean="0"/>
-              <a:t>6/6/2022</a:t>
+              <a:t>6/27/2022</a:t>
             </a:fld>
             <a:endParaRPr lang="en-US"/>
           </a:p>
@@ -2296,7 +2296,7 @@
           <a:p>
             <a:fld id="{8EDD969E-CD30-4974-94D4-028BE01ED462}" type="datetimeFigureOut">
               <a:rPr lang="en-US" smtClean="0"/>
-              <a:t>6/6/2022</a:t>
+              <a:t>6/27/2022</a:t>
             </a:fld>
             <a:endParaRPr lang="en-US"/>
           </a:p>
@@ -2391,7 +2391,7 @@
           <a:p>
             <a:fld id="{8EDD969E-CD30-4974-94D4-028BE01ED462}" type="datetimeFigureOut">
               <a:rPr lang="en-US" smtClean="0"/>
-              <a:t>6/6/2022</a:t>
+              <a:t>6/27/2022</a:t>
             </a:fld>
             <a:endParaRPr lang="en-US"/>
           </a:p>
@@ -2741,7 +2741,7 @@
           <a:p>
             <a:fld id="{8EDD969E-CD30-4974-94D4-028BE01ED462}" type="datetimeFigureOut">
               <a:rPr lang="en-US" smtClean="0"/>
-              <a:t>6/6/2022</a:t>
+              <a:t>6/27/2022</a:t>
             </a:fld>
             <a:endParaRPr lang="en-US"/>
           </a:p>
@@ -3166,7 +3166,7 @@
           <a:p>
             <a:fld id="{8EDD969E-CD30-4974-94D4-028BE01ED462}" type="datetimeFigureOut">
               <a:rPr lang="en-US" smtClean="0"/>
-              <a:t>6/6/2022</a:t>
+              <a:t>6/27/2022</a:t>
             </a:fld>
             <a:endParaRPr lang="en-US"/>
           </a:p>
@@ -3452,7 +3452,7 @@
           <a:p>
             <a:fld id="{8EDD969E-CD30-4974-94D4-028BE01ED462}" type="datetimeFigureOut">
               <a:rPr lang="en-US" smtClean="0"/>
-              <a:t>6/6/2022</a:t>
+              <a:t>6/27/2022</a:t>
             </a:fld>
             <a:endParaRPr lang="en-US"/>
           </a:p>
@@ -4716,7 +4716,7 @@
                   <a:schemeClr val="tx1"/>
                 </a:solidFill>
               </a:rPr>
-              <a:t>Tests should be clean too!</a:t>
+              <a:t>Avoid subtle duplication</a:t>
             </a:r>
             <a:endParaRPr lang="en-US" sz="6100" u="sng" dirty="0">
               <a:solidFill>

</xml_diff>

<commit_message>
[OK] FIRST Unit Tests (#284)
* Firtst draft

* Grammar check

* Updated cover image

Co-authored-by: Davide Bellone <davide.bellone>
</commit_message>
<xml_diff>
--- a/layout-cover-tips.pptx
+++ b/layout-cover-tips.pptx
@@ -516,7 +516,7 @@
           <a:p>
             <a:fld id="{8EDD969E-CD30-4974-94D4-028BE01ED462}" type="datetimeFigureOut">
               <a:rPr lang="en-US" smtClean="0"/>
-              <a:t>7/5/2022</a:t>
+              <a:t>7/19/2022</a:t>
             </a:fld>
             <a:endParaRPr lang="en-US"/>
           </a:p>
@@ -695,7 +695,7 @@
           <a:p>
             <a:fld id="{8EDD969E-CD30-4974-94D4-028BE01ED462}" type="datetimeFigureOut">
               <a:rPr lang="en-US" smtClean="0"/>
-              <a:t>7/5/2022</a:t>
+              <a:t>7/19/2022</a:t>
             </a:fld>
             <a:endParaRPr lang="en-US"/>
           </a:p>
@@ -875,7 +875,7 @@
           <a:p>
             <a:fld id="{8EDD969E-CD30-4974-94D4-028BE01ED462}" type="datetimeFigureOut">
               <a:rPr lang="en-US" smtClean="0"/>
-              <a:t>7/5/2022</a:t>
+              <a:t>7/19/2022</a:t>
             </a:fld>
             <a:endParaRPr lang="en-US"/>
           </a:p>
@@ -1045,7 +1045,7 @@
           <a:p>
             <a:fld id="{8EDD969E-CD30-4974-94D4-028BE01ED462}" type="datetimeFigureOut">
               <a:rPr lang="en-US" smtClean="0"/>
-              <a:t>7/5/2022</a:t>
+              <a:t>7/19/2022</a:t>
             </a:fld>
             <a:endParaRPr lang="en-US"/>
           </a:p>
@@ -1358,7 +1358,7 @@
           <a:p>
             <a:fld id="{8EDD969E-CD30-4974-94D4-028BE01ED462}" type="datetimeFigureOut">
               <a:rPr lang="en-US" smtClean="0"/>
-              <a:t>7/5/2022</a:t>
+              <a:t>7/19/2022</a:t>
             </a:fld>
             <a:endParaRPr lang="en-US"/>
           </a:p>
@@ -1744,7 +1744,7 @@
           <a:p>
             <a:fld id="{8EDD969E-CD30-4974-94D4-028BE01ED462}" type="datetimeFigureOut">
               <a:rPr lang="en-US" smtClean="0"/>
-              <a:t>7/5/2022</a:t>
+              <a:t>7/19/2022</a:t>
             </a:fld>
             <a:endParaRPr lang="en-US"/>
           </a:p>
@@ -2178,7 +2178,7 @@
           <a:p>
             <a:fld id="{8EDD969E-CD30-4974-94D4-028BE01ED462}" type="datetimeFigureOut">
               <a:rPr lang="en-US" smtClean="0"/>
-              <a:t>7/5/2022</a:t>
+              <a:t>7/19/2022</a:t>
             </a:fld>
             <a:endParaRPr lang="en-US"/>
           </a:p>
@@ -2296,7 +2296,7 @@
           <a:p>
             <a:fld id="{8EDD969E-CD30-4974-94D4-028BE01ED462}" type="datetimeFigureOut">
               <a:rPr lang="en-US" smtClean="0"/>
-              <a:t>7/5/2022</a:t>
+              <a:t>7/19/2022</a:t>
             </a:fld>
             <a:endParaRPr lang="en-US"/>
           </a:p>
@@ -2391,7 +2391,7 @@
           <a:p>
             <a:fld id="{8EDD969E-CD30-4974-94D4-028BE01ED462}" type="datetimeFigureOut">
               <a:rPr lang="en-US" smtClean="0"/>
-              <a:t>7/5/2022</a:t>
+              <a:t>7/19/2022</a:t>
             </a:fld>
             <a:endParaRPr lang="en-US"/>
           </a:p>
@@ -2741,7 +2741,7 @@
           <a:p>
             <a:fld id="{8EDD969E-CD30-4974-94D4-028BE01ED462}" type="datetimeFigureOut">
               <a:rPr lang="en-US" smtClean="0"/>
-              <a:t>7/5/2022</a:t>
+              <a:t>7/19/2022</a:t>
             </a:fld>
             <a:endParaRPr lang="en-US"/>
           </a:p>
@@ -3166,7 +3166,7 @@
           <a:p>
             <a:fld id="{8EDD969E-CD30-4974-94D4-028BE01ED462}" type="datetimeFigureOut">
               <a:rPr lang="en-US" smtClean="0"/>
-              <a:t>7/5/2022</a:t>
+              <a:t>7/19/2022</a:t>
             </a:fld>
             <a:endParaRPr lang="en-US"/>
           </a:p>
@@ -3452,7 +3452,7 @@
           <a:p>
             <a:fld id="{8EDD969E-CD30-4974-94D4-028BE01ED462}" type="datetimeFigureOut">
               <a:rPr lang="en-US" smtClean="0"/>
-              <a:t>7/5/2022</a:t>
+              <a:t>7/19/2022</a:t>
             </a:fld>
             <a:endParaRPr lang="en-US"/>
           </a:p>
@@ -4700,14 +4700,29 @@
               </a:rPr>
             </a:br>
             <a:r>
-              <a:rPr lang="en-US" sz="6100" dirty="0">
+              <a:rPr lang="en-US" sz="6100" b="1" dirty="0">
                 <a:solidFill>
                   <a:schemeClr val="tx1"/>
                 </a:solidFill>
               </a:rPr>
-              <a:t>Avoid subtle duplication</a:t>
-            </a:r>
-            <a:endParaRPr lang="en-US" sz="6100" u="sng" dirty="0">
+              <a:t>F.I.R.S.T.</a:t>
+            </a:r>
+            <a:br>
+              <a:rPr lang="en-US" sz="6100" b="1" dirty="0">
+                <a:solidFill>
+                  <a:schemeClr val="tx1"/>
+                </a:solidFill>
+              </a:rPr>
+            </a:br>
+            <a:r>
+              <a:rPr lang="en-US" sz="5400" dirty="0">
+                <a:solidFill>
+                  <a:schemeClr val="tx1"/>
+                </a:solidFill>
+              </a:rPr>
+              <a:t>Unit tests</a:t>
+            </a:r>
+            <a:endParaRPr lang="en-US" sz="5400" u="sng" dirty="0">
               <a:solidFill>
                 <a:schemeClr val="tx1"/>
               </a:solidFill>

</xml_diff>

<commit_message>
[OK] C# tip: MiniProfiler (#312)
* First draft

* Added image

* Completed article

* Postponed publication

Co-authored-by: Davide Bellone <davide.bellone>
</commit_message>
<xml_diff>
--- a/layout-cover-tips.pptx
+++ b/layout-cover-tips.pptx
@@ -516,7 +516,7 @@
           <a:p>
             <a:fld id="{8EDD969E-CD30-4974-94D4-028BE01ED462}" type="datetimeFigureOut">
               <a:rPr lang="en-US" smtClean="0"/>
-              <a:t>7/19/2022</a:t>
+              <a:t>8/2/2022</a:t>
             </a:fld>
             <a:endParaRPr lang="en-US"/>
           </a:p>
@@ -695,7 +695,7 @@
           <a:p>
             <a:fld id="{8EDD969E-CD30-4974-94D4-028BE01ED462}" type="datetimeFigureOut">
               <a:rPr lang="en-US" smtClean="0"/>
-              <a:t>7/19/2022</a:t>
+              <a:t>8/2/2022</a:t>
             </a:fld>
             <a:endParaRPr lang="en-US"/>
           </a:p>
@@ -875,7 +875,7 @@
           <a:p>
             <a:fld id="{8EDD969E-CD30-4974-94D4-028BE01ED462}" type="datetimeFigureOut">
               <a:rPr lang="en-US" smtClean="0"/>
-              <a:t>7/19/2022</a:t>
+              <a:t>8/2/2022</a:t>
             </a:fld>
             <a:endParaRPr lang="en-US"/>
           </a:p>
@@ -1045,7 +1045,7 @@
           <a:p>
             <a:fld id="{8EDD969E-CD30-4974-94D4-028BE01ED462}" type="datetimeFigureOut">
               <a:rPr lang="en-US" smtClean="0"/>
-              <a:t>7/19/2022</a:t>
+              <a:t>8/2/2022</a:t>
             </a:fld>
             <a:endParaRPr lang="en-US"/>
           </a:p>
@@ -1358,7 +1358,7 @@
           <a:p>
             <a:fld id="{8EDD969E-CD30-4974-94D4-028BE01ED462}" type="datetimeFigureOut">
               <a:rPr lang="en-US" smtClean="0"/>
-              <a:t>7/19/2022</a:t>
+              <a:t>8/2/2022</a:t>
             </a:fld>
             <a:endParaRPr lang="en-US"/>
           </a:p>
@@ -1744,7 +1744,7 @@
           <a:p>
             <a:fld id="{8EDD969E-CD30-4974-94D4-028BE01ED462}" type="datetimeFigureOut">
               <a:rPr lang="en-US" smtClean="0"/>
-              <a:t>7/19/2022</a:t>
+              <a:t>8/2/2022</a:t>
             </a:fld>
             <a:endParaRPr lang="en-US"/>
           </a:p>
@@ -2178,7 +2178,7 @@
           <a:p>
             <a:fld id="{8EDD969E-CD30-4974-94D4-028BE01ED462}" type="datetimeFigureOut">
               <a:rPr lang="en-US" smtClean="0"/>
-              <a:t>7/19/2022</a:t>
+              <a:t>8/2/2022</a:t>
             </a:fld>
             <a:endParaRPr lang="en-US"/>
           </a:p>
@@ -2296,7 +2296,7 @@
           <a:p>
             <a:fld id="{8EDD969E-CD30-4974-94D4-028BE01ED462}" type="datetimeFigureOut">
               <a:rPr lang="en-US" smtClean="0"/>
-              <a:t>7/19/2022</a:t>
+              <a:t>8/2/2022</a:t>
             </a:fld>
             <a:endParaRPr lang="en-US"/>
           </a:p>
@@ -2391,7 +2391,7 @@
           <a:p>
             <a:fld id="{8EDD969E-CD30-4974-94D4-028BE01ED462}" type="datetimeFigureOut">
               <a:rPr lang="en-US" smtClean="0"/>
-              <a:t>7/19/2022</a:t>
+              <a:t>8/2/2022</a:t>
             </a:fld>
             <a:endParaRPr lang="en-US"/>
           </a:p>
@@ -2741,7 +2741,7 @@
           <a:p>
             <a:fld id="{8EDD969E-CD30-4974-94D4-028BE01ED462}" type="datetimeFigureOut">
               <a:rPr lang="en-US" smtClean="0"/>
-              <a:t>7/19/2022</a:t>
+              <a:t>8/2/2022</a:t>
             </a:fld>
             <a:endParaRPr lang="en-US"/>
           </a:p>
@@ -3166,7 +3166,7 @@
           <a:p>
             <a:fld id="{8EDD969E-CD30-4974-94D4-028BE01ED462}" type="datetimeFigureOut">
               <a:rPr lang="en-US" smtClean="0"/>
-              <a:t>7/19/2022</a:t>
+              <a:t>8/2/2022</a:t>
             </a:fld>
             <a:endParaRPr lang="en-US"/>
           </a:p>
@@ -3452,7 +3452,7 @@
           <a:p>
             <a:fld id="{8EDD969E-CD30-4974-94D4-028BE01ED462}" type="datetimeFigureOut">
               <a:rPr lang="en-US" smtClean="0"/>
-              <a:t>7/19/2022</a:t>
+              <a:t>8/2/2022</a:t>
             </a:fld>
             <a:endParaRPr lang="en-US"/>
           </a:p>
@@ -4241,7 +4241,7 @@
         </p:spPr>
         <p:txBody>
           <a:bodyPr anchor="b">
-            <a:normAutofit/>
+            <a:normAutofit fontScale="90000"/>
           </a:bodyPr>
           <a:lstStyle/>
           <a:p>
@@ -4258,14 +4258,14 @@
             </a:br>
             <a:r>
               <a:rPr lang="en-GB" sz="7500" cap="none" dirty="0"/>
-              <a:t>LINQ’s </a:t>
+              <a:t>Profiling code with </a:t>
             </a:r>
             <a:br>
               <a:rPr lang="en-GB" sz="7500" cap="none" dirty="0"/>
             </a:br>
             <a:r>
-              <a:rPr lang="en-GB" sz="7500" b="1" u="sng" cap="none" dirty="0" err="1"/>
-              <a:t>SelectMany</a:t>
+              <a:rPr lang="en-GB" sz="7500" b="1" cap="none" dirty="0"/>
+              <a:t>MINIPROFILER</a:t>
             </a:r>
             <a:endParaRPr lang="en-US" sz="7600" b="1" u="sng" cap="none" dirty="0"/>
           </a:p>

</xml_diff>

<commit_message>
[Draft] Exceptions instead of null (#354)
* Created article

* Fixed old article

* Fixed articles

Co-authored-by: Davide Bellone <davide.bellone>
</commit_message>
<xml_diff>
--- a/layout-cover-tips.pptx
+++ b/layout-cover-tips.pptx
@@ -7,6 +7,7 @@
   <p:sldIdLst>
     <p:sldId id="256" r:id="rId2"/>
     <p:sldId id="257" r:id="rId3"/>
+    <p:sldId id="258" r:id="rId4"/>
   </p:sldIdLst>
   <p:sldSz cx="12192000" cy="6858000"/>
   <p:notesSz cx="6858000" cy="9144000"/>
@@ -516,7 +517,7 @@
           <a:p>
             <a:fld id="{8EDD969E-CD30-4974-94D4-028BE01ED462}" type="datetimeFigureOut">
               <a:rPr lang="en-US" smtClean="0"/>
-              <a:t>8/2/2022</a:t>
+              <a:t>9/20/2022</a:t>
             </a:fld>
             <a:endParaRPr lang="en-US"/>
           </a:p>
@@ -695,7 +696,7 @@
           <a:p>
             <a:fld id="{8EDD969E-CD30-4974-94D4-028BE01ED462}" type="datetimeFigureOut">
               <a:rPr lang="en-US" smtClean="0"/>
-              <a:t>8/2/2022</a:t>
+              <a:t>9/20/2022</a:t>
             </a:fld>
             <a:endParaRPr lang="en-US"/>
           </a:p>
@@ -875,7 +876,7 @@
           <a:p>
             <a:fld id="{8EDD969E-CD30-4974-94D4-028BE01ED462}" type="datetimeFigureOut">
               <a:rPr lang="en-US" smtClean="0"/>
-              <a:t>8/2/2022</a:t>
+              <a:t>9/20/2022</a:t>
             </a:fld>
             <a:endParaRPr lang="en-US"/>
           </a:p>
@@ -1045,7 +1046,7 @@
           <a:p>
             <a:fld id="{8EDD969E-CD30-4974-94D4-028BE01ED462}" type="datetimeFigureOut">
               <a:rPr lang="en-US" smtClean="0"/>
-              <a:t>8/2/2022</a:t>
+              <a:t>9/20/2022</a:t>
             </a:fld>
             <a:endParaRPr lang="en-US"/>
           </a:p>
@@ -1358,7 +1359,7 @@
           <a:p>
             <a:fld id="{8EDD969E-CD30-4974-94D4-028BE01ED462}" type="datetimeFigureOut">
               <a:rPr lang="en-US" smtClean="0"/>
-              <a:t>8/2/2022</a:t>
+              <a:t>9/20/2022</a:t>
             </a:fld>
             <a:endParaRPr lang="en-US"/>
           </a:p>
@@ -1744,7 +1745,7 @@
           <a:p>
             <a:fld id="{8EDD969E-CD30-4974-94D4-028BE01ED462}" type="datetimeFigureOut">
               <a:rPr lang="en-US" smtClean="0"/>
-              <a:t>8/2/2022</a:t>
+              <a:t>9/20/2022</a:t>
             </a:fld>
             <a:endParaRPr lang="en-US"/>
           </a:p>
@@ -2178,7 +2179,7 @@
           <a:p>
             <a:fld id="{8EDD969E-CD30-4974-94D4-028BE01ED462}" type="datetimeFigureOut">
               <a:rPr lang="en-US" smtClean="0"/>
-              <a:t>8/2/2022</a:t>
+              <a:t>9/20/2022</a:t>
             </a:fld>
             <a:endParaRPr lang="en-US"/>
           </a:p>
@@ -2296,7 +2297,7 @@
           <a:p>
             <a:fld id="{8EDD969E-CD30-4974-94D4-028BE01ED462}" type="datetimeFigureOut">
               <a:rPr lang="en-US" smtClean="0"/>
-              <a:t>8/2/2022</a:t>
+              <a:t>9/20/2022</a:t>
             </a:fld>
             <a:endParaRPr lang="en-US"/>
           </a:p>
@@ -2391,7 +2392,7 @@
           <a:p>
             <a:fld id="{8EDD969E-CD30-4974-94D4-028BE01ED462}" type="datetimeFigureOut">
               <a:rPr lang="en-US" smtClean="0"/>
-              <a:t>8/2/2022</a:t>
+              <a:t>9/20/2022</a:t>
             </a:fld>
             <a:endParaRPr lang="en-US"/>
           </a:p>
@@ -2741,7 +2742,7 @@
           <a:p>
             <a:fld id="{8EDD969E-CD30-4974-94D4-028BE01ED462}" type="datetimeFigureOut">
               <a:rPr lang="en-US" smtClean="0"/>
-              <a:t>8/2/2022</a:t>
+              <a:t>9/20/2022</a:t>
             </a:fld>
             <a:endParaRPr lang="en-US"/>
           </a:p>
@@ -3166,7 +3167,7 @@
           <a:p>
             <a:fld id="{8EDD969E-CD30-4974-94D4-028BE01ED462}" type="datetimeFigureOut">
               <a:rPr lang="en-US" smtClean="0"/>
-              <a:t>8/2/2022</a:t>
+              <a:t>9/20/2022</a:t>
             </a:fld>
             <a:endParaRPr lang="en-US"/>
           </a:p>
@@ -3452,7 +3453,7 @@
           <a:p>
             <a:fld id="{8EDD969E-CD30-4974-94D4-028BE01ED462}" type="datetimeFigureOut">
               <a:rPr lang="en-US" smtClean="0"/>
-              <a:t>8/2/2022</a:t>
+              <a:t>9/20/2022</a:t>
             </a:fld>
             <a:endParaRPr lang="en-US"/>
           </a:p>
@@ -4673,7 +4674,7 @@
         </p:spPr>
         <p:txBody>
           <a:bodyPr anchor="b">
-            <a:normAutofit/>
+            <a:normAutofit fontScale="90000"/>
           </a:bodyPr>
           <a:lstStyle/>
           <a:p>
@@ -4700,27 +4701,12 @@
               </a:rPr>
             </a:br>
             <a:r>
-              <a:rPr lang="en-US" sz="6100" b="1" dirty="0">
+              <a:rPr lang="en-US" sz="4800" b="1" dirty="0">
                 <a:solidFill>
                   <a:schemeClr val="tx1"/>
                 </a:solidFill>
               </a:rPr>
-              <a:t>F.I.R.S.T.</a:t>
-            </a:r>
-            <a:br>
-              <a:rPr lang="en-US" sz="6100" b="1" dirty="0">
-                <a:solidFill>
-                  <a:schemeClr val="tx1"/>
-                </a:solidFill>
-              </a:rPr>
-            </a:br>
-            <a:r>
-              <a:rPr lang="en-US" sz="5400" dirty="0">
-                <a:solidFill>
-                  <a:schemeClr val="tx1"/>
-                </a:solidFill>
-              </a:rPr>
-              <a:t>Unit tests</a:t>
+              <a:t>Throw exceptions instead of returning null (or not?)</a:t>
             </a:r>
             <a:endParaRPr lang="en-US" sz="5400" u="sng" dirty="0">
               <a:solidFill>
@@ -5000,6 +4986,565 @@
   </p:cSld>
   <p:clrMapOvr>
     <a:overrideClrMapping bg1="dk1" tx1="lt1" bg2="dk2" tx2="lt2" accent1="accent1" accent2="accent2" accent3="accent3" accent4="accent4" accent5="accent5" accent6="accent6" hlink="hlink" folHlink="folHlink"/>
+  </p:clrMapOvr>
+</p:sld>
+</file>
+
+<file path=ppt/slides/slide3.xml><?xml version="1.0" encoding="utf-8"?>
+<p:sld xmlns:a="http://schemas.openxmlformats.org/drawingml/2006/main" xmlns:r="http://schemas.openxmlformats.org/officeDocument/2006/relationships" xmlns:p="http://schemas.openxmlformats.org/presentationml/2006/main">
+  <p:cSld>
+    <p:bg>
+      <p:bgPr>
+        <a:solidFill>
+          <a:schemeClr val="bg1"/>
+        </a:solidFill>
+        <a:effectLst/>
+      </p:bgPr>
+    </p:bg>
+    <p:spTree>
+      <p:nvGrpSpPr>
+        <p:cNvPr id="1" name=""/>
+        <p:cNvGrpSpPr/>
+        <p:nvPr/>
+      </p:nvGrpSpPr>
+      <p:grpSpPr>
+        <a:xfrm>
+          <a:off x="0" y="0"/>
+          <a:ext cx="0" cy="0"/>
+          <a:chOff x="0" y="0"/>
+          <a:chExt cx="0" cy="0"/>
+        </a:xfrm>
+      </p:grpSpPr>
+      <p:sp>
+        <p:nvSpPr>
+          <p:cNvPr id="26" name="Rectangle 25">
+            <a:extLst>
+              <a:ext uri="{FF2B5EF4-FFF2-40B4-BE49-F238E27FC236}">
+                <a16:creationId xmlns:a16="http://schemas.microsoft.com/office/drawing/2014/main" id="{EB384DB2-5DBE-4000-BBD8-68F4A6F35310}"/>
+              </a:ext>
+              <a:ext uri="{C183D7F6-B498-43B3-948B-1728B52AA6E4}">
+                <adec:decorative xmlns:adec="http://schemas.microsoft.com/office/drawing/2017/decorative" val="1"/>
+              </a:ext>
+            </a:extLst>
+          </p:cNvPr>
+          <p:cNvSpPr>
+            <a:spLocks noGrp="1" noRot="1" noChangeAspect="1" noMove="1" noResize="1" noEditPoints="1" noAdjustHandles="1" noChangeArrowheads="1" noChangeShapeType="1" noTextEdit="1"/>
+          </p:cNvSpPr>
+          <p:nvPr>
+            <p:extLst>
+              <p:ext uri="{386F3935-93C4-4BCD-93E2-E3B085C9AB24}">
+                <p16:designElem xmlns:p16="http://schemas.microsoft.com/office/powerpoint/2015/main" val="1"/>
+              </p:ext>
+            </p:extLst>
+          </p:nvPr>
+        </p:nvSpPr>
+        <p:spPr bwMode="white">
+          <a:xfrm>
+            <a:off x="0" y="0"/>
+            <a:ext cx="12188952" cy="6858001"/>
+          </a:xfrm>
+          <a:prstGeom prst="rect">
+            <a:avLst/>
+          </a:prstGeom>
+          <a:solidFill>
+            <a:schemeClr val="bg1"/>
+          </a:solidFill>
+          <a:ln>
+            <a:noFill/>
+          </a:ln>
+        </p:spPr>
+        <p:style>
+          <a:lnRef idx="2">
+            <a:schemeClr val="accent1">
+              <a:shade val="50000"/>
+            </a:schemeClr>
+          </a:lnRef>
+          <a:fillRef idx="1">
+            <a:schemeClr val="accent1"/>
+          </a:fillRef>
+          <a:effectRef idx="0">
+            <a:schemeClr val="accent1"/>
+          </a:effectRef>
+          <a:fontRef idx="minor">
+            <a:schemeClr val="lt1"/>
+          </a:fontRef>
+        </p:style>
+        <p:txBody>
+          <a:bodyPr rot="0" spcFirstLastPara="0" vert="horz" wrap="square" lIns="91440" tIns="45720" rIns="91440" bIns="45720" numCol="1" spcCol="0" rtlCol="0" fromWordArt="0" anchor="ctr" anchorCtr="0" forceAA="0" compatLnSpc="1">
+            <a:prstTxWarp prst="textNoShape">
+              <a:avLst/>
+            </a:prstTxWarp>
+            <a:noAutofit/>
+          </a:bodyPr>
+          <a:lstStyle>
+            <a:defPPr>
+              <a:defRPr lang="en-US"/>
+            </a:defPPr>
+            <a:lvl1pPr marL="0" algn="l" defTabSz="914400" rtl="0" eaLnBrk="1" latinLnBrk="0" hangingPunct="1">
+              <a:defRPr sz="1800" kern="1200">
+                <a:solidFill>
+                  <a:schemeClr val="lt1"/>
+                </a:solidFill>
+                <a:latin typeface="+mn-lt"/>
+                <a:ea typeface="+mn-ea"/>
+                <a:cs typeface="+mn-cs"/>
+              </a:defRPr>
+            </a:lvl1pPr>
+            <a:lvl2pPr marL="457200" algn="l" defTabSz="914400" rtl="0" eaLnBrk="1" latinLnBrk="0" hangingPunct="1">
+              <a:defRPr sz="1800" kern="1200">
+                <a:solidFill>
+                  <a:schemeClr val="lt1"/>
+                </a:solidFill>
+                <a:latin typeface="+mn-lt"/>
+                <a:ea typeface="+mn-ea"/>
+                <a:cs typeface="+mn-cs"/>
+              </a:defRPr>
+            </a:lvl2pPr>
+            <a:lvl3pPr marL="914400" algn="l" defTabSz="914400" rtl="0" eaLnBrk="1" latinLnBrk="0" hangingPunct="1">
+              <a:defRPr sz="1800" kern="1200">
+                <a:solidFill>
+                  <a:schemeClr val="lt1"/>
+                </a:solidFill>
+                <a:latin typeface="+mn-lt"/>
+                <a:ea typeface="+mn-ea"/>
+                <a:cs typeface="+mn-cs"/>
+              </a:defRPr>
+            </a:lvl3pPr>
+            <a:lvl4pPr marL="1371600" algn="l" defTabSz="914400" rtl="0" eaLnBrk="1" latinLnBrk="0" hangingPunct="1">
+              <a:defRPr sz="1800" kern="1200">
+                <a:solidFill>
+                  <a:schemeClr val="lt1"/>
+                </a:solidFill>
+                <a:latin typeface="+mn-lt"/>
+                <a:ea typeface="+mn-ea"/>
+                <a:cs typeface="+mn-cs"/>
+              </a:defRPr>
+            </a:lvl4pPr>
+            <a:lvl5pPr marL="1828800" algn="l" defTabSz="914400" rtl="0" eaLnBrk="1" latinLnBrk="0" hangingPunct="1">
+              <a:defRPr sz="1800" kern="1200">
+                <a:solidFill>
+                  <a:schemeClr val="lt1"/>
+                </a:solidFill>
+                <a:latin typeface="+mn-lt"/>
+                <a:ea typeface="+mn-ea"/>
+                <a:cs typeface="+mn-cs"/>
+              </a:defRPr>
+            </a:lvl5pPr>
+            <a:lvl6pPr marL="2286000" algn="l" defTabSz="914400" rtl="0" eaLnBrk="1" latinLnBrk="0" hangingPunct="1">
+              <a:defRPr sz="1800" kern="1200">
+                <a:solidFill>
+                  <a:schemeClr val="lt1"/>
+                </a:solidFill>
+                <a:latin typeface="+mn-lt"/>
+                <a:ea typeface="+mn-ea"/>
+                <a:cs typeface="+mn-cs"/>
+              </a:defRPr>
+            </a:lvl6pPr>
+            <a:lvl7pPr marL="2743200" algn="l" defTabSz="914400" rtl="0" eaLnBrk="1" latinLnBrk="0" hangingPunct="1">
+              <a:defRPr sz="1800" kern="1200">
+                <a:solidFill>
+                  <a:schemeClr val="lt1"/>
+                </a:solidFill>
+                <a:latin typeface="+mn-lt"/>
+                <a:ea typeface="+mn-ea"/>
+                <a:cs typeface="+mn-cs"/>
+              </a:defRPr>
+            </a:lvl7pPr>
+            <a:lvl8pPr marL="3200400" algn="l" defTabSz="914400" rtl="0" eaLnBrk="1" latinLnBrk="0" hangingPunct="1">
+              <a:defRPr sz="1800" kern="1200">
+                <a:solidFill>
+                  <a:schemeClr val="lt1"/>
+                </a:solidFill>
+                <a:latin typeface="+mn-lt"/>
+                <a:ea typeface="+mn-ea"/>
+                <a:cs typeface="+mn-cs"/>
+              </a:defRPr>
+            </a:lvl8pPr>
+            <a:lvl9pPr marL="3657600" algn="l" defTabSz="914400" rtl="0" eaLnBrk="1" latinLnBrk="0" hangingPunct="1">
+              <a:defRPr sz="1800" kern="1200">
+                <a:solidFill>
+                  <a:schemeClr val="lt1"/>
+                </a:solidFill>
+                <a:latin typeface="+mn-lt"/>
+                <a:ea typeface="+mn-ea"/>
+                <a:cs typeface="+mn-cs"/>
+              </a:defRPr>
+            </a:lvl9pPr>
+          </a:lstStyle>
+          <a:p>
+            <a:pPr algn="ctr"/>
+            <a:endParaRPr lang="en-US"/>
+          </a:p>
+        </p:txBody>
+      </p:sp>
+      <p:sp>
+        <p:nvSpPr>
+          <p:cNvPr id="28" name="Rectangle 27">
+            <a:extLst>
+              <a:ext uri="{FF2B5EF4-FFF2-40B4-BE49-F238E27FC236}">
+                <a16:creationId xmlns:a16="http://schemas.microsoft.com/office/drawing/2014/main" id="{F8497EEB-0DDE-4044-AAB7-899504057148}"/>
+              </a:ext>
+              <a:ext uri="{C183D7F6-B498-43B3-948B-1728B52AA6E4}">
+                <adec:decorative xmlns:adec="http://schemas.microsoft.com/office/drawing/2017/decorative" val="1"/>
+              </a:ext>
+            </a:extLst>
+          </p:cNvPr>
+          <p:cNvSpPr>
+            <a:spLocks noGrp="1" noRot="1" noChangeAspect="1" noMove="1" noResize="1" noEditPoints="1" noAdjustHandles="1" noChangeArrowheads="1" noChangeShapeType="1" noTextEdit="1"/>
+          </p:cNvSpPr>
+          <p:nvPr>
+            <p:extLst>
+              <p:ext uri="{386F3935-93C4-4BCD-93E2-E3B085C9AB24}">
+                <p16:designElem xmlns:p16="http://schemas.microsoft.com/office/powerpoint/2015/main" val="1"/>
+              </p:ext>
+            </p:extLst>
+          </p:nvPr>
+        </p:nvSpPr>
+        <p:spPr>
+          <a:xfrm>
+            <a:off x="0" y="3772078"/>
+            <a:ext cx="12192000" cy="3095754"/>
+          </a:xfrm>
+          <a:prstGeom prst="rect">
+            <a:avLst/>
+          </a:prstGeom>
+          <a:blipFill dpi="0" rotWithShape="1">
+            <a:blip r:embed="rId2">
+              <a:alphaModFix amt="85000"/>
+              <a:lum bright="70000" contrast="-70000"/>
+              <a:extLst>
+                <a:ext uri="{BEBA8EAE-BF5A-486C-A8C5-ECC9F3942E4B}">
+                  <a14:imgProps xmlns:a14="http://schemas.microsoft.com/office/drawing/2010/main">
+                    <a14:imgLayer r:embed="rId3">
+                      <a14:imgEffect>
+                        <a14:sharpenSoften amount="61000"/>
+                      </a14:imgEffect>
+                    </a14:imgLayer>
+                  </a14:imgProps>
+                </a:ext>
+                <a:ext uri="{28A0092B-C50C-407E-A947-70E740481C1C}">
+                  <a14:useLocalDpi xmlns:a14="http://schemas.microsoft.com/office/drawing/2010/main" val="0"/>
+                </a:ext>
+              </a:extLst>
+            </a:blip>
+            <a:srcRect/>
+            <a:tile tx="0" ty="-704850" sx="92000" sy="89000" flip="xy" algn="ctr"/>
+          </a:blipFill>
+          <a:ln>
+            <a:noFill/>
+          </a:ln>
+        </p:spPr>
+        <p:style>
+          <a:lnRef idx="2">
+            <a:schemeClr val="accent1">
+              <a:shade val="50000"/>
+            </a:schemeClr>
+          </a:lnRef>
+          <a:fillRef idx="1">
+            <a:schemeClr val="accent1"/>
+          </a:fillRef>
+          <a:effectRef idx="0">
+            <a:schemeClr val="accent1"/>
+          </a:effectRef>
+          <a:fontRef idx="minor">
+            <a:schemeClr val="lt1"/>
+          </a:fontRef>
+        </p:style>
+        <p:txBody>
+          <a:bodyPr rtlCol="0" anchor="ctr"/>
+          <a:lstStyle/>
+          <a:p>
+            <a:pPr algn="ctr"/>
+            <a:endParaRPr lang="en-US"/>
+          </a:p>
+        </p:txBody>
+      </p:sp>
+      <p:grpSp>
+        <p:nvGrpSpPr>
+          <p:cNvPr id="30" name="Group 29">
+            <a:extLst>
+              <a:ext uri="{FF2B5EF4-FFF2-40B4-BE49-F238E27FC236}">
+                <a16:creationId xmlns:a16="http://schemas.microsoft.com/office/drawing/2014/main" id="{291D5588-0A43-44F8-8BF9-4BD0CB07312F}"/>
+              </a:ext>
+              <a:ext uri="{C183D7F6-B498-43B3-948B-1728B52AA6E4}">
+                <adec:decorative xmlns:adec="http://schemas.microsoft.com/office/drawing/2017/decorative" val="1"/>
+              </a:ext>
+            </a:extLst>
+          </p:cNvPr>
+          <p:cNvGrpSpPr>
+            <a:grpSpLocks noGrp="1" noUngrp="1" noRot="1" noChangeAspect="1" noMove="1" noResize="1"/>
+          </p:cNvGrpSpPr>
+          <p:nvPr>
+            <p:extLst>
+              <p:ext uri="{386F3935-93C4-4BCD-93E2-E3B085C9AB24}">
+                <p16:designElem xmlns:p16="http://schemas.microsoft.com/office/powerpoint/2015/main" val="1"/>
+              </p:ext>
+            </p:extLst>
+          </p:nvPr>
+        </p:nvGrpSpPr>
+        <p:grpSpPr>
+          <a:xfrm>
+            <a:off x="10245590" y="5218262"/>
+            <a:ext cx="1080904" cy="1080902"/>
+            <a:chOff x="9685338" y="4460675"/>
+            <a:chExt cx="1080904" cy="1080902"/>
+          </a:xfrm>
+        </p:grpSpPr>
+        <p:sp>
+          <p:nvSpPr>
+            <p:cNvPr id="31" name="Oval 30">
+              <a:extLst>
+                <a:ext uri="{FF2B5EF4-FFF2-40B4-BE49-F238E27FC236}">
+                  <a16:creationId xmlns:a16="http://schemas.microsoft.com/office/drawing/2014/main" id="{C96F04B2-EA02-4F51-91CB-9399DBE7244F}"/>
+                </a:ext>
+                <a:ext uri="{C183D7F6-B498-43B3-948B-1728B52AA6E4}">
+                  <adec:decorative xmlns:adec="http://schemas.microsoft.com/office/drawing/2017/decorative" val="1"/>
+                </a:ext>
+              </a:extLst>
+            </p:cNvPr>
+            <p:cNvSpPr/>
+            <p:nvPr>
+              <p:extLst>
+                <p:ext uri="{386F3935-93C4-4BCD-93E2-E3B085C9AB24}">
+                  <p16:designElem xmlns:p16="http://schemas.microsoft.com/office/powerpoint/2015/main" val="1"/>
+                </p:ext>
+              </p:extLst>
+            </p:nvPr>
+          </p:nvSpPr>
+          <p:spPr>
+            <a:xfrm>
+              <a:off x="9685338" y="4460675"/>
+              <a:ext cx="1080904" cy="1080902"/>
+            </a:xfrm>
+            <a:prstGeom prst="ellipse">
+              <a:avLst/>
+            </a:prstGeom>
+            <a:blipFill dpi="0" rotWithShape="1">
+              <a:blip r:embed="rId4">
+                <a:duotone>
+                  <a:schemeClr val="accent1">
+                    <a:shade val="45000"/>
+                    <a:satMod val="135000"/>
+                  </a:schemeClr>
+                  <a:prstClr val="white"/>
+                </a:duotone>
+              </a:blip>
+              <a:srcRect/>
+              <a:tile tx="0" ty="0" sx="85000" sy="85000" flip="none" algn="tl"/>
+            </a:blipFill>
+            <a:ln w="25400" cap="flat" cmpd="sng" algn="ctr">
+              <a:noFill/>
+              <a:prstDash val="solid"/>
+            </a:ln>
+            <a:effectLst/>
+          </p:spPr>
+          <p:txBody>
+            <a:bodyPr lIns="0" tIns="0" rIns="0" bIns="0" rtlCol="0" anchor="ctr"/>
+            <a:lstStyle/>
+            <a:p>
+              <a:pPr marL="0" marR="0" lvl="0" indent="0" algn="ctr" defTabSz="914400" eaLnBrk="1" fontAlgn="auto" latinLnBrk="0" hangingPunct="1">
+                <a:lnSpc>
+                  <a:spcPct val="100000"/>
+                </a:lnSpc>
+                <a:spcBef>
+                  <a:spcPts val="0"/>
+                </a:spcBef>
+                <a:spcAft>
+                  <a:spcPts val="0"/>
+                </a:spcAft>
+                <a:buClrTx/>
+                <a:buSzTx/>
+                <a:buFontTx/>
+                <a:buNone/>
+                <a:tabLst/>
+                <a:defRPr/>
+              </a:pPr>
+              <a:endParaRPr kumimoji="0" lang="en-US" sz="2000" b="0" i="0" u="none" strike="noStrike" kern="0" cap="none" spc="0" normalizeH="0" baseline="0" noProof="0" dirty="0">
+                <a:ln>
+                  <a:noFill/>
+                </a:ln>
+                <a:solidFill>
+                  <a:prstClr val="white"/>
+                </a:solidFill>
+                <a:effectLst/>
+                <a:uLnTx/>
+                <a:uFillTx/>
+                <a:latin typeface="Rockwell Extra Bold" pitchFamily="18" charset="0"/>
+                <a:ea typeface="+mn-ea"/>
+                <a:cs typeface="+mn-cs"/>
+              </a:endParaRPr>
+            </a:p>
+          </p:txBody>
+        </p:sp>
+        <p:sp>
+          <p:nvSpPr>
+            <p:cNvPr id="32" name="Oval 31">
+              <a:extLst>
+                <a:ext uri="{FF2B5EF4-FFF2-40B4-BE49-F238E27FC236}">
+                  <a16:creationId xmlns:a16="http://schemas.microsoft.com/office/drawing/2014/main" id="{524F9A86-344F-4139-A831-9D8F3E0EED5A}"/>
+                </a:ext>
+                <a:ext uri="{C183D7F6-B498-43B3-948B-1728B52AA6E4}">
+                  <adec:decorative xmlns:adec="http://schemas.microsoft.com/office/drawing/2017/decorative" val="1"/>
+                </a:ext>
+              </a:extLst>
+            </p:cNvPr>
+            <p:cNvSpPr/>
+            <p:nvPr>
+              <p:extLst>
+                <p:ext uri="{386F3935-93C4-4BCD-93E2-E3B085C9AB24}">
+                  <p16:designElem xmlns:p16="http://schemas.microsoft.com/office/powerpoint/2015/main" val="1"/>
+                </p:ext>
+              </p:extLst>
+            </p:nvPr>
+          </p:nvSpPr>
+          <p:spPr>
+            <a:xfrm>
+              <a:off x="9793429" y="4568765"/>
+              <a:ext cx="864723" cy="864722"/>
+            </a:xfrm>
+            <a:prstGeom prst="ellipse">
+              <a:avLst/>
+            </a:prstGeom>
+            <a:noFill/>
+            <a:ln w="25400" cap="flat" cmpd="sng" algn="ctr">
+              <a:solidFill>
+                <a:sysClr val="window" lastClr="FFFFFF"/>
+              </a:solidFill>
+              <a:prstDash val="solid"/>
+            </a:ln>
+            <a:effectLst/>
+          </p:spPr>
+          <p:txBody>
+            <a:bodyPr rtlCol="0" anchor="ctr"/>
+            <a:lstStyle/>
+            <a:p>
+              <a:pPr marL="0" marR="0" lvl="0" indent="0" algn="ctr" defTabSz="914400" eaLnBrk="1" fontAlgn="auto" latinLnBrk="0" hangingPunct="1">
+                <a:lnSpc>
+                  <a:spcPct val="100000"/>
+                </a:lnSpc>
+                <a:spcBef>
+                  <a:spcPts val="0"/>
+                </a:spcBef>
+                <a:spcAft>
+                  <a:spcPts val="0"/>
+                </a:spcAft>
+                <a:buClrTx/>
+                <a:buSzTx/>
+                <a:buFontTx/>
+                <a:buNone/>
+                <a:tabLst/>
+                <a:defRPr/>
+              </a:pPr>
+              <a:endParaRPr kumimoji="0" lang="en-US" sz="1800" b="0" i="0" u="none" strike="noStrike" kern="0" cap="none" spc="0" normalizeH="0" baseline="0" noProof="0" dirty="0">
+                <a:ln>
+                  <a:noFill/>
+                </a:ln>
+                <a:solidFill>
+                  <a:prstClr val="white"/>
+                </a:solidFill>
+                <a:effectLst/>
+                <a:uLnTx/>
+                <a:uFillTx/>
+                <a:latin typeface="Calibri"/>
+                <a:ea typeface="+mn-ea"/>
+                <a:cs typeface="+mn-cs"/>
+              </a:endParaRPr>
+            </a:p>
+          </p:txBody>
+        </p:sp>
+      </p:grpSp>
+      <p:sp>
+        <p:nvSpPr>
+          <p:cNvPr id="2" name="Title 1">
+            <a:extLst>
+              <a:ext uri="{FF2B5EF4-FFF2-40B4-BE49-F238E27FC236}">
+                <a16:creationId xmlns:a16="http://schemas.microsoft.com/office/drawing/2014/main" id="{A4168FF9-3F52-4F30-9F57-324B0195FBD7}"/>
+              </a:ext>
+            </a:extLst>
+          </p:cNvPr>
+          <p:cNvSpPr>
+            <a:spLocks noGrp="1"/>
+          </p:cNvSpPr>
+          <p:nvPr>
+            <p:ph type="ctrTitle"/>
+          </p:nvPr>
+        </p:nvSpPr>
+        <p:spPr>
+          <a:xfrm>
+            <a:off x="2078105" y="3803009"/>
+            <a:ext cx="8032742" cy="1999077"/>
+          </a:xfrm>
+        </p:spPr>
+        <p:txBody>
+          <a:bodyPr anchor="b">
+            <a:normAutofit/>
+          </a:bodyPr>
+          <a:lstStyle/>
+          <a:p>
+            <a:pPr algn="ctr"/>
+            <a:r>
+              <a:rPr lang="en-US" sz="2900" u="sng" dirty="0"/>
+              <a:t>Software architecture notes</a:t>
+            </a:r>
+            <a:br>
+              <a:rPr lang="en-US" sz="2900" u="sng" dirty="0"/>
+            </a:br>
+            <a:br>
+              <a:rPr lang="en-US" sz="2900" dirty="0"/>
+            </a:br>
+            <a:r>
+              <a:rPr lang="en-US" sz="2900" b="1" dirty="0"/>
+              <a:t>Throw exceptions instead of returning null (or not?)</a:t>
+            </a:r>
+            <a:endParaRPr lang="en-US" sz="2900" u="sng" dirty="0"/>
+          </a:p>
+        </p:txBody>
+      </p:sp>
+      <p:pic>
+        <p:nvPicPr>
+          <p:cNvPr id="5" name="Picture 4" descr="Logo&#10;&#10;Description automatically generated with medium confidence">
+            <a:extLst>
+              <a:ext uri="{FF2B5EF4-FFF2-40B4-BE49-F238E27FC236}">
+                <a16:creationId xmlns:a16="http://schemas.microsoft.com/office/drawing/2014/main" id="{07A3483B-1F6E-4D93-8E06-102933498B46}"/>
+              </a:ext>
+            </a:extLst>
+          </p:cNvPr>
+          <p:cNvPicPr>
+            <a:picLocks noChangeAspect="1"/>
+          </p:cNvPicPr>
+          <p:nvPr/>
+        </p:nvPicPr>
+        <p:blipFill>
+          <a:blip r:embed="rId5">
+            <a:extLst>
+              <a:ext uri="{28A0092B-C50C-407E-A947-70E740481C1C}">
+                <a14:useLocalDpi xmlns:a14="http://schemas.microsoft.com/office/drawing/2010/main" val="0"/>
+              </a:ext>
+            </a:extLst>
+          </a:blip>
+          <a:stretch>
+            <a:fillRect/>
+          </a:stretch>
+        </p:blipFill>
+        <p:spPr>
+          <a:xfrm>
+            <a:off x="4757166" y="643468"/>
+            <a:ext cx="2677667" cy="2795060"/>
+          </a:xfrm>
+          <a:prstGeom prst="rect">
+            <a:avLst/>
+          </a:prstGeom>
+        </p:spPr>
+      </p:pic>
+    </p:spTree>
+    <p:extLst>
+      <p:ext uri="{BB962C8B-B14F-4D97-AF65-F5344CB8AC3E}">
+        <p14:creationId xmlns:p14="http://schemas.microsoft.com/office/powerpoint/2010/main" val="1024463229"/>
+      </p:ext>
+    </p:extLst>
+  </p:cSld>
+  <p:clrMapOvr>
+    <a:masterClrMapping/>
   </p:clrMapOvr>
 </p:sld>
 </file>

</xml_diff>

<commit_message>
[OK] dry or not dry (#357)
* First draft

* Finished article

Co-authored-by: Davide Bellone <davide.bellone>
</commit_message>
<xml_diff>
--- a/layout-cover-tips.pptx
+++ b/layout-cover-tips.pptx
@@ -7,7 +7,6 @@
   <p:sldIdLst>
     <p:sldId id="256" r:id="rId2"/>
     <p:sldId id="257" r:id="rId3"/>
-    <p:sldId id="258" r:id="rId4"/>
   </p:sldIdLst>
   <p:sldSz cx="12192000" cy="6858000"/>
   <p:notesSz cx="6858000" cy="9144000"/>
@@ -517,7 +516,7 @@
           <a:p>
             <a:fld id="{8EDD969E-CD30-4974-94D4-028BE01ED462}" type="datetimeFigureOut">
               <a:rPr lang="en-US" smtClean="0"/>
-              <a:t>9/20/2022</a:t>
+              <a:t>9/27/2022</a:t>
             </a:fld>
             <a:endParaRPr lang="en-US"/>
           </a:p>
@@ -696,7 +695,7 @@
           <a:p>
             <a:fld id="{8EDD969E-CD30-4974-94D4-028BE01ED462}" type="datetimeFigureOut">
               <a:rPr lang="en-US" smtClean="0"/>
-              <a:t>9/20/2022</a:t>
+              <a:t>9/27/2022</a:t>
             </a:fld>
             <a:endParaRPr lang="en-US"/>
           </a:p>
@@ -876,7 +875,7 @@
           <a:p>
             <a:fld id="{8EDD969E-CD30-4974-94D4-028BE01ED462}" type="datetimeFigureOut">
               <a:rPr lang="en-US" smtClean="0"/>
-              <a:t>9/20/2022</a:t>
+              <a:t>9/27/2022</a:t>
             </a:fld>
             <a:endParaRPr lang="en-US"/>
           </a:p>
@@ -1046,7 +1045,7 @@
           <a:p>
             <a:fld id="{8EDD969E-CD30-4974-94D4-028BE01ED462}" type="datetimeFigureOut">
               <a:rPr lang="en-US" smtClean="0"/>
-              <a:t>9/20/2022</a:t>
+              <a:t>9/27/2022</a:t>
             </a:fld>
             <a:endParaRPr lang="en-US"/>
           </a:p>
@@ -1359,7 +1358,7 @@
           <a:p>
             <a:fld id="{8EDD969E-CD30-4974-94D4-028BE01ED462}" type="datetimeFigureOut">
               <a:rPr lang="en-US" smtClean="0"/>
-              <a:t>9/20/2022</a:t>
+              <a:t>9/27/2022</a:t>
             </a:fld>
             <a:endParaRPr lang="en-US"/>
           </a:p>
@@ -1745,7 +1744,7 @@
           <a:p>
             <a:fld id="{8EDD969E-CD30-4974-94D4-028BE01ED462}" type="datetimeFigureOut">
               <a:rPr lang="en-US" smtClean="0"/>
-              <a:t>9/20/2022</a:t>
+              <a:t>9/27/2022</a:t>
             </a:fld>
             <a:endParaRPr lang="en-US"/>
           </a:p>
@@ -2179,7 +2178,7 @@
           <a:p>
             <a:fld id="{8EDD969E-CD30-4974-94D4-028BE01ED462}" type="datetimeFigureOut">
               <a:rPr lang="en-US" smtClean="0"/>
-              <a:t>9/20/2022</a:t>
+              <a:t>9/27/2022</a:t>
             </a:fld>
             <a:endParaRPr lang="en-US"/>
           </a:p>
@@ -2297,7 +2296,7 @@
           <a:p>
             <a:fld id="{8EDD969E-CD30-4974-94D4-028BE01ED462}" type="datetimeFigureOut">
               <a:rPr lang="en-US" smtClean="0"/>
-              <a:t>9/20/2022</a:t>
+              <a:t>9/27/2022</a:t>
             </a:fld>
             <a:endParaRPr lang="en-US"/>
           </a:p>
@@ -2392,7 +2391,7 @@
           <a:p>
             <a:fld id="{8EDD969E-CD30-4974-94D4-028BE01ED462}" type="datetimeFigureOut">
               <a:rPr lang="en-US" smtClean="0"/>
-              <a:t>9/20/2022</a:t>
+              <a:t>9/27/2022</a:t>
             </a:fld>
             <a:endParaRPr lang="en-US"/>
           </a:p>
@@ -2742,7 +2741,7 @@
           <a:p>
             <a:fld id="{8EDD969E-CD30-4974-94D4-028BE01ED462}" type="datetimeFigureOut">
               <a:rPr lang="en-US" smtClean="0"/>
-              <a:t>9/20/2022</a:t>
+              <a:t>9/27/2022</a:t>
             </a:fld>
             <a:endParaRPr lang="en-US"/>
           </a:p>
@@ -3167,7 +3166,7 @@
           <a:p>
             <a:fld id="{8EDD969E-CD30-4974-94D4-028BE01ED462}" type="datetimeFigureOut">
               <a:rPr lang="en-US" smtClean="0"/>
-              <a:t>9/20/2022</a:t>
+              <a:t>9/27/2022</a:t>
             </a:fld>
             <a:endParaRPr lang="en-US"/>
           </a:p>
@@ -3453,7 +3452,7 @@
           <a:p>
             <a:fld id="{8EDD969E-CD30-4974-94D4-028BE01ED462}" type="datetimeFigureOut">
               <a:rPr lang="en-US" smtClean="0"/>
-              <a:t>9/20/2022</a:t>
+              <a:t>9/27/2022</a:t>
             </a:fld>
             <a:endParaRPr lang="en-US"/>
           </a:p>
@@ -4674,7 +4673,7 @@
         </p:spPr>
         <p:txBody>
           <a:bodyPr anchor="b">
-            <a:normAutofit fontScale="90000"/>
+            <a:normAutofit/>
           </a:bodyPr>
           <a:lstStyle/>
           <a:p>
@@ -4701,12 +4700,50 @@
               </a:rPr>
             </a:br>
             <a:r>
-              <a:rPr lang="en-US" sz="4800" b="1" dirty="0">
+              <a:rPr lang="en-US" sz="6100" b="1">
                 <a:solidFill>
                   <a:schemeClr val="tx1"/>
                 </a:solidFill>
               </a:rPr>
-              <a:t>Throw exceptions instead of returning null (or not?)</a:t>
+              <a:t>DRY </a:t>
+            </a:r>
+            <a:br>
+              <a:rPr lang="en-US" sz="6100" b="1">
+                <a:solidFill>
+                  <a:schemeClr val="tx1"/>
+                </a:solidFill>
+              </a:rPr>
+            </a:br>
+            <a:r>
+              <a:rPr lang="en-US" sz="3600" b="1">
+                <a:solidFill>
+                  <a:schemeClr val="tx1"/>
+                </a:solidFill>
+              </a:rPr>
+              <a:t>or not</a:t>
+            </a:r>
+            <a:br>
+              <a:rPr lang="en-US" sz="3600" b="1">
+                <a:solidFill>
+                  <a:schemeClr val="tx1"/>
+                </a:solidFill>
+              </a:rPr>
+            </a:br>
+            <a:r>
+              <a:rPr lang="en-US" sz="6100" b="1">
+                <a:solidFill>
+                  <a:schemeClr val="tx1"/>
+                </a:solidFill>
+              </a:rPr>
+              <a:t>DRY</a:t>
+            </a:r>
+            <a:r>
+              <a:rPr lang="en-US" sz="6100" b="1" dirty="0">
+                <a:solidFill>
+                  <a:schemeClr val="tx1"/>
+                </a:solidFill>
+              </a:rPr>
+              <a:t>?</a:t>
             </a:r>
             <a:endParaRPr lang="en-US" sz="5400" u="sng" dirty="0">
               <a:solidFill>
@@ -4986,565 +5023,6 @@
   </p:cSld>
   <p:clrMapOvr>
     <a:overrideClrMapping bg1="dk1" tx1="lt1" bg2="dk2" tx2="lt2" accent1="accent1" accent2="accent2" accent3="accent3" accent4="accent4" accent5="accent5" accent6="accent6" hlink="hlink" folHlink="folHlink"/>
-  </p:clrMapOvr>
-</p:sld>
-</file>
-
-<file path=ppt/slides/slide3.xml><?xml version="1.0" encoding="utf-8"?>
-<p:sld xmlns:a="http://schemas.openxmlformats.org/drawingml/2006/main" xmlns:r="http://schemas.openxmlformats.org/officeDocument/2006/relationships" xmlns:p="http://schemas.openxmlformats.org/presentationml/2006/main">
-  <p:cSld>
-    <p:bg>
-      <p:bgPr>
-        <a:solidFill>
-          <a:schemeClr val="bg1"/>
-        </a:solidFill>
-        <a:effectLst/>
-      </p:bgPr>
-    </p:bg>
-    <p:spTree>
-      <p:nvGrpSpPr>
-        <p:cNvPr id="1" name=""/>
-        <p:cNvGrpSpPr/>
-        <p:nvPr/>
-      </p:nvGrpSpPr>
-      <p:grpSpPr>
-        <a:xfrm>
-          <a:off x="0" y="0"/>
-          <a:ext cx="0" cy="0"/>
-          <a:chOff x="0" y="0"/>
-          <a:chExt cx="0" cy="0"/>
-        </a:xfrm>
-      </p:grpSpPr>
-      <p:sp>
-        <p:nvSpPr>
-          <p:cNvPr id="26" name="Rectangle 25">
-            <a:extLst>
-              <a:ext uri="{FF2B5EF4-FFF2-40B4-BE49-F238E27FC236}">
-                <a16:creationId xmlns:a16="http://schemas.microsoft.com/office/drawing/2014/main" id="{EB384DB2-5DBE-4000-BBD8-68F4A6F35310}"/>
-              </a:ext>
-              <a:ext uri="{C183D7F6-B498-43B3-948B-1728B52AA6E4}">
-                <adec:decorative xmlns:adec="http://schemas.microsoft.com/office/drawing/2017/decorative" val="1"/>
-              </a:ext>
-            </a:extLst>
-          </p:cNvPr>
-          <p:cNvSpPr>
-            <a:spLocks noGrp="1" noRot="1" noChangeAspect="1" noMove="1" noResize="1" noEditPoints="1" noAdjustHandles="1" noChangeArrowheads="1" noChangeShapeType="1" noTextEdit="1"/>
-          </p:cNvSpPr>
-          <p:nvPr>
-            <p:extLst>
-              <p:ext uri="{386F3935-93C4-4BCD-93E2-E3B085C9AB24}">
-                <p16:designElem xmlns:p16="http://schemas.microsoft.com/office/powerpoint/2015/main" val="1"/>
-              </p:ext>
-            </p:extLst>
-          </p:nvPr>
-        </p:nvSpPr>
-        <p:spPr bwMode="white">
-          <a:xfrm>
-            <a:off x="0" y="0"/>
-            <a:ext cx="12188952" cy="6858001"/>
-          </a:xfrm>
-          <a:prstGeom prst="rect">
-            <a:avLst/>
-          </a:prstGeom>
-          <a:solidFill>
-            <a:schemeClr val="bg1"/>
-          </a:solidFill>
-          <a:ln>
-            <a:noFill/>
-          </a:ln>
-        </p:spPr>
-        <p:style>
-          <a:lnRef idx="2">
-            <a:schemeClr val="accent1">
-              <a:shade val="50000"/>
-            </a:schemeClr>
-          </a:lnRef>
-          <a:fillRef idx="1">
-            <a:schemeClr val="accent1"/>
-          </a:fillRef>
-          <a:effectRef idx="0">
-            <a:schemeClr val="accent1"/>
-          </a:effectRef>
-          <a:fontRef idx="minor">
-            <a:schemeClr val="lt1"/>
-          </a:fontRef>
-        </p:style>
-        <p:txBody>
-          <a:bodyPr rot="0" spcFirstLastPara="0" vert="horz" wrap="square" lIns="91440" tIns="45720" rIns="91440" bIns="45720" numCol="1" spcCol="0" rtlCol="0" fromWordArt="0" anchor="ctr" anchorCtr="0" forceAA="0" compatLnSpc="1">
-            <a:prstTxWarp prst="textNoShape">
-              <a:avLst/>
-            </a:prstTxWarp>
-            <a:noAutofit/>
-          </a:bodyPr>
-          <a:lstStyle>
-            <a:defPPr>
-              <a:defRPr lang="en-US"/>
-            </a:defPPr>
-            <a:lvl1pPr marL="0" algn="l" defTabSz="914400" rtl="0" eaLnBrk="1" latinLnBrk="0" hangingPunct="1">
-              <a:defRPr sz="1800" kern="1200">
-                <a:solidFill>
-                  <a:schemeClr val="lt1"/>
-                </a:solidFill>
-                <a:latin typeface="+mn-lt"/>
-                <a:ea typeface="+mn-ea"/>
-                <a:cs typeface="+mn-cs"/>
-              </a:defRPr>
-            </a:lvl1pPr>
-            <a:lvl2pPr marL="457200" algn="l" defTabSz="914400" rtl="0" eaLnBrk="1" latinLnBrk="0" hangingPunct="1">
-              <a:defRPr sz="1800" kern="1200">
-                <a:solidFill>
-                  <a:schemeClr val="lt1"/>
-                </a:solidFill>
-                <a:latin typeface="+mn-lt"/>
-                <a:ea typeface="+mn-ea"/>
-                <a:cs typeface="+mn-cs"/>
-              </a:defRPr>
-            </a:lvl2pPr>
-            <a:lvl3pPr marL="914400" algn="l" defTabSz="914400" rtl="0" eaLnBrk="1" latinLnBrk="0" hangingPunct="1">
-              <a:defRPr sz="1800" kern="1200">
-                <a:solidFill>
-                  <a:schemeClr val="lt1"/>
-                </a:solidFill>
-                <a:latin typeface="+mn-lt"/>
-                <a:ea typeface="+mn-ea"/>
-                <a:cs typeface="+mn-cs"/>
-              </a:defRPr>
-            </a:lvl3pPr>
-            <a:lvl4pPr marL="1371600" algn="l" defTabSz="914400" rtl="0" eaLnBrk="1" latinLnBrk="0" hangingPunct="1">
-              <a:defRPr sz="1800" kern="1200">
-                <a:solidFill>
-                  <a:schemeClr val="lt1"/>
-                </a:solidFill>
-                <a:latin typeface="+mn-lt"/>
-                <a:ea typeface="+mn-ea"/>
-                <a:cs typeface="+mn-cs"/>
-              </a:defRPr>
-            </a:lvl4pPr>
-            <a:lvl5pPr marL="1828800" algn="l" defTabSz="914400" rtl="0" eaLnBrk="1" latinLnBrk="0" hangingPunct="1">
-              <a:defRPr sz="1800" kern="1200">
-                <a:solidFill>
-                  <a:schemeClr val="lt1"/>
-                </a:solidFill>
-                <a:latin typeface="+mn-lt"/>
-                <a:ea typeface="+mn-ea"/>
-                <a:cs typeface="+mn-cs"/>
-              </a:defRPr>
-            </a:lvl5pPr>
-            <a:lvl6pPr marL="2286000" algn="l" defTabSz="914400" rtl="0" eaLnBrk="1" latinLnBrk="0" hangingPunct="1">
-              <a:defRPr sz="1800" kern="1200">
-                <a:solidFill>
-                  <a:schemeClr val="lt1"/>
-                </a:solidFill>
-                <a:latin typeface="+mn-lt"/>
-                <a:ea typeface="+mn-ea"/>
-                <a:cs typeface="+mn-cs"/>
-              </a:defRPr>
-            </a:lvl6pPr>
-            <a:lvl7pPr marL="2743200" algn="l" defTabSz="914400" rtl="0" eaLnBrk="1" latinLnBrk="0" hangingPunct="1">
-              <a:defRPr sz="1800" kern="1200">
-                <a:solidFill>
-                  <a:schemeClr val="lt1"/>
-                </a:solidFill>
-                <a:latin typeface="+mn-lt"/>
-                <a:ea typeface="+mn-ea"/>
-                <a:cs typeface="+mn-cs"/>
-              </a:defRPr>
-            </a:lvl7pPr>
-            <a:lvl8pPr marL="3200400" algn="l" defTabSz="914400" rtl="0" eaLnBrk="1" latinLnBrk="0" hangingPunct="1">
-              <a:defRPr sz="1800" kern="1200">
-                <a:solidFill>
-                  <a:schemeClr val="lt1"/>
-                </a:solidFill>
-                <a:latin typeface="+mn-lt"/>
-                <a:ea typeface="+mn-ea"/>
-                <a:cs typeface="+mn-cs"/>
-              </a:defRPr>
-            </a:lvl8pPr>
-            <a:lvl9pPr marL="3657600" algn="l" defTabSz="914400" rtl="0" eaLnBrk="1" latinLnBrk="0" hangingPunct="1">
-              <a:defRPr sz="1800" kern="1200">
-                <a:solidFill>
-                  <a:schemeClr val="lt1"/>
-                </a:solidFill>
-                <a:latin typeface="+mn-lt"/>
-                <a:ea typeface="+mn-ea"/>
-                <a:cs typeface="+mn-cs"/>
-              </a:defRPr>
-            </a:lvl9pPr>
-          </a:lstStyle>
-          <a:p>
-            <a:pPr algn="ctr"/>
-            <a:endParaRPr lang="en-US"/>
-          </a:p>
-        </p:txBody>
-      </p:sp>
-      <p:sp>
-        <p:nvSpPr>
-          <p:cNvPr id="28" name="Rectangle 27">
-            <a:extLst>
-              <a:ext uri="{FF2B5EF4-FFF2-40B4-BE49-F238E27FC236}">
-                <a16:creationId xmlns:a16="http://schemas.microsoft.com/office/drawing/2014/main" id="{F8497EEB-0DDE-4044-AAB7-899504057148}"/>
-              </a:ext>
-              <a:ext uri="{C183D7F6-B498-43B3-948B-1728B52AA6E4}">
-                <adec:decorative xmlns:adec="http://schemas.microsoft.com/office/drawing/2017/decorative" val="1"/>
-              </a:ext>
-            </a:extLst>
-          </p:cNvPr>
-          <p:cNvSpPr>
-            <a:spLocks noGrp="1" noRot="1" noChangeAspect="1" noMove="1" noResize="1" noEditPoints="1" noAdjustHandles="1" noChangeArrowheads="1" noChangeShapeType="1" noTextEdit="1"/>
-          </p:cNvSpPr>
-          <p:nvPr>
-            <p:extLst>
-              <p:ext uri="{386F3935-93C4-4BCD-93E2-E3B085C9AB24}">
-                <p16:designElem xmlns:p16="http://schemas.microsoft.com/office/powerpoint/2015/main" val="1"/>
-              </p:ext>
-            </p:extLst>
-          </p:nvPr>
-        </p:nvSpPr>
-        <p:spPr>
-          <a:xfrm>
-            <a:off x="0" y="3772078"/>
-            <a:ext cx="12192000" cy="3095754"/>
-          </a:xfrm>
-          <a:prstGeom prst="rect">
-            <a:avLst/>
-          </a:prstGeom>
-          <a:blipFill dpi="0" rotWithShape="1">
-            <a:blip r:embed="rId2">
-              <a:alphaModFix amt="85000"/>
-              <a:lum bright="70000" contrast="-70000"/>
-              <a:extLst>
-                <a:ext uri="{BEBA8EAE-BF5A-486C-A8C5-ECC9F3942E4B}">
-                  <a14:imgProps xmlns:a14="http://schemas.microsoft.com/office/drawing/2010/main">
-                    <a14:imgLayer r:embed="rId3">
-                      <a14:imgEffect>
-                        <a14:sharpenSoften amount="61000"/>
-                      </a14:imgEffect>
-                    </a14:imgLayer>
-                  </a14:imgProps>
-                </a:ext>
-                <a:ext uri="{28A0092B-C50C-407E-A947-70E740481C1C}">
-                  <a14:useLocalDpi xmlns:a14="http://schemas.microsoft.com/office/drawing/2010/main" val="0"/>
-                </a:ext>
-              </a:extLst>
-            </a:blip>
-            <a:srcRect/>
-            <a:tile tx="0" ty="-704850" sx="92000" sy="89000" flip="xy" algn="ctr"/>
-          </a:blipFill>
-          <a:ln>
-            <a:noFill/>
-          </a:ln>
-        </p:spPr>
-        <p:style>
-          <a:lnRef idx="2">
-            <a:schemeClr val="accent1">
-              <a:shade val="50000"/>
-            </a:schemeClr>
-          </a:lnRef>
-          <a:fillRef idx="1">
-            <a:schemeClr val="accent1"/>
-          </a:fillRef>
-          <a:effectRef idx="0">
-            <a:schemeClr val="accent1"/>
-          </a:effectRef>
-          <a:fontRef idx="minor">
-            <a:schemeClr val="lt1"/>
-          </a:fontRef>
-        </p:style>
-        <p:txBody>
-          <a:bodyPr rtlCol="0" anchor="ctr"/>
-          <a:lstStyle/>
-          <a:p>
-            <a:pPr algn="ctr"/>
-            <a:endParaRPr lang="en-US"/>
-          </a:p>
-        </p:txBody>
-      </p:sp>
-      <p:grpSp>
-        <p:nvGrpSpPr>
-          <p:cNvPr id="30" name="Group 29">
-            <a:extLst>
-              <a:ext uri="{FF2B5EF4-FFF2-40B4-BE49-F238E27FC236}">
-                <a16:creationId xmlns:a16="http://schemas.microsoft.com/office/drawing/2014/main" id="{291D5588-0A43-44F8-8BF9-4BD0CB07312F}"/>
-              </a:ext>
-              <a:ext uri="{C183D7F6-B498-43B3-948B-1728B52AA6E4}">
-                <adec:decorative xmlns:adec="http://schemas.microsoft.com/office/drawing/2017/decorative" val="1"/>
-              </a:ext>
-            </a:extLst>
-          </p:cNvPr>
-          <p:cNvGrpSpPr>
-            <a:grpSpLocks noGrp="1" noUngrp="1" noRot="1" noChangeAspect="1" noMove="1" noResize="1"/>
-          </p:cNvGrpSpPr>
-          <p:nvPr>
-            <p:extLst>
-              <p:ext uri="{386F3935-93C4-4BCD-93E2-E3B085C9AB24}">
-                <p16:designElem xmlns:p16="http://schemas.microsoft.com/office/powerpoint/2015/main" val="1"/>
-              </p:ext>
-            </p:extLst>
-          </p:nvPr>
-        </p:nvGrpSpPr>
-        <p:grpSpPr>
-          <a:xfrm>
-            <a:off x="10245590" y="5218262"/>
-            <a:ext cx="1080904" cy="1080902"/>
-            <a:chOff x="9685338" y="4460675"/>
-            <a:chExt cx="1080904" cy="1080902"/>
-          </a:xfrm>
-        </p:grpSpPr>
-        <p:sp>
-          <p:nvSpPr>
-            <p:cNvPr id="31" name="Oval 30">
-              <a:extLst>
-                <a:ext uri="{FF2B5EF4-FFF2-40B4-BE49-F238E27FC236}">
-                  <a16:creationId xmlns:a16="http://schemas.microsoft.com/office/drawing/2014/main" id="{C96F04B2-EA02-4F51-91CB-9399DBE7244F}"/>
-                </a:ext>
-                <a:ext uri="{C183D7F6-B498-43B3-948B-1728B52AA6E4}">
-                  <adec:decorative xmlns:adec="http://schemas.microsoft.com/office/drawing/2017/decorative" val="1"/>
-                </a:ext>
-              </a:extLst>
-            </p:cNvPr>
-            <p:cNvSpPr/>
-            <p:nvPr>
-              <p:extLst>
-                <p:ext uri="{386F3935-93C4-4BCD-93E2-E3B085C9AB24}">
-                  <p16:designElem xmlns:p16="http://schemas.microsoft.com/office/powerpoint/2015/main" val="1"/>
-                </p:ext>
-              </p:extLst>
-            </p:nvPr>
-          </p:nvSpPr>
-          <p:spPr>
-            <a:xfrm>
-              <a:off x="9685338" y="4460675"/>
-              <a:ext cx="1080904" cy="1080902"/>
-            </a:xfrm>
-            <a:prstGeom prst="ellipse">
-              <a:avLst/>
-            </a:prstGeom>
-            <a:blipFill dpi="0" rotWithShape="1">
-              <a:blip r:embed="rId4">
-                <a:duotone>
-                  <a:schemeClr val="accent1">
-                    <a:shade val="45000"/>
-                    <a:satMod val="135000"/>
-                  </a:schemeClr>
-                  <a:prstClr val="white"/>
-                </a:duotone>
-              </a:blip>
-              <a:srcRect/>
-              <a:tile tx="0" ty="0" sx="85000" sy="85000" flip="none" algn="tl"/>
-            </a:blipFill>
-            <a:ln w="25400" cap="flat" cmpd="sng" algn="ctr">
-              <a:noFill/>
-              <a:prstDash val="solid"/>
-            </a:ln>
-            <a:effectLst/>
-          </p:spPr>
-          <p:txBody>
-            <a:bodyPr lIns="0" tIns="0" rIns="0" bIns="0" rtlCol="0" anchor="ctr"/>
-            <a:lstStyle/>
-            <a:p>
-              <a:pPr marL="0" marR="0" lvl="0" indent="0" algn="ctr" defTabSz="914400" eaLnBrk="1" fontAlgn="auto" latinLnBrk="0" hangingPunct="1">
-                <a:lnSpc>
-                  <a:spcPct val="100000"/>
-                </a:lnSpc>
-                <a:spcBef>
-                  <a:spcPts val="0"/>
-                </a:spcBef>
-                <a:spcAft>
-                  <a:spcPts val="0"/>
-                </a:spcAft>
-                <a:buClrTx/>
-                <a:buSzTx/>
-                <a:buFontTx/>
-                <a:buNone/>
-                <a:tabLst/>
-                <a:defRPr/>
-              </a:pPr>
-              <a:endParaRPr kumimoji="0" lang="en-US" sz="2000" b="0" i="0" u="none" strike="noStrike" kern="0" cap="none" spc="0" normalizeH="0" baseline="0" noProof="0" dirty="0">
-                <a:ln>
-                  <a:noFill/>
-                </a:ln>
-                <a:solidFill>
-                  <a:prstClr val="white"/>
-                </a:solidFill>
-                <a:effectLst/>
-                <a:uLnTx/>
-                <a:uFillTx/>
-                <a:latin typeface="Rockwell Extra Bold" pitchFamily="18" charset="0"/>
-                <a:ea typeface="+mn-ea"/>
-                <a:cs typeface="+mn-cs"/>
-              </a:endParaRPr>
-            </a:p>
-          </p:txBody>
-        </p:sp>
-        <p:sp>
-          <p:nvSpPr>
-            <p:cNvPr id="32" name="Oval 31">
-              <a:extLst>
-                <a:ext uri="{FF2B5EF4-FFF2-40B4-BE49-F238E27FC236}">
-                  <a16:creationId xmlns:a16="http://schemas.microsoft.com/office/drawing/2014/main" id="{524F9A86-344F-4139-A831-9D8F3E0EED5A}"/>
-                </a:ext>
-                <a:ext uri="{C183D7F6-B498-43B3-948B-1728B52AA6E4}">
-                  <adec:decorative xmlns:adec="http://schemas.microsoft.com/office/drawing/2017/decorative" val="1"/>
-                </a:ext>
-              </a:extLst>
-            </p:cNvPr>
-            <p:cNvSpPr/>
-            <p:nvPr>
-              <p:extLst>
-                <p:ext uri="{386F3935-93C4-4BCD-93E2-E3B085C9AB24}">
-                  <p16:designElem xmlns:p16="http://schemas.microsoft.com/office/powerpoint/2015/main" val="1"/>
-                </p:ext>
-              </p:extLst>
-            </p:nvPr>
-          </p:nvSpPr>
-          <p:spPr>
-            <a:xfrm>
-              <a:off x="9793429" y="4568765"/>
-              <a:ext cx="864723" cy="864722"/>
-            </a:xfrm>
-            <a:prstGeom prst="ellipse">
-              <a:avLst/>
-            </a:prstGeom>
-            <a:noFill/>
-            <a:ln w="25400" cap="flat" cmpd="sng" algn="ctr">
-              <a:solidFill>
-                <a:sysClr val="window" lastClr="FFFFFF"/>
-              </a:solidFill>
-              <a:prstDash val="solid"/>
-            </a:ln>
-            <a:effectLst/>
-          </p:spPr>
-          <p:txBody>
-            <a:bodyPr rtlCol="0" anchor="ctr"/>
-            <a:lstStyle/>
-            <a:p>
-              <a:pPr marL="0" marR="0" lvl="0" indent="0" algn="ctr" defTabSz="914400" eaLnBrk="1" fontAlgn="auto" latinLnBrk="0" hangingPunct="1">
-                <a:lnSpc>
-                  <a:spcPct val="100000"/>
-                </a:lnSpc>
-                <a:spcBef>
-                  <a:spcPts val="0"/>
-                </a:spcBef>
-                <a:spcAft>
-                  <a:spcPts val="0"/>
-                </a:spcAft>
-                <a:buClrTx/>
-                <a:buSzTx/>
-                <a:buFontTx/>
-                <a:buNone/>
-                <a:tabLst/>
-                <a:defRPr/>
-              </a:pPr>
-              <a:endParaRPr kumimoji="0" lang="en-US" sz="1800" b="0" i="0" u="none" strike="noStrike" kern="0" cap="none" spc="0" normalizeH="0" baseline="0" noProof="0" dirty="0">
-                <a:ln>
-                  <a:noFill/>
-                </a:ln>
-                <a:solidFill>
-                  <a:prstClr val="white"/>
-                </a:solidFill>
-                <a:effectLst/>
-                <a:uLnTx/>
-                <a:uFillTx/>
-                <a:latin typeface="Calibri"/>
-                <a:ea typeface="+mn-ea"/>
-                <a:cs typeface="+mn-cs"/>
-              </a:endParaRPr>
-            </a:p>
-          </p:txBody>
-        </p:sp>
-      </p:grpSp>
-      <p:sp>
-        <p:nvSpPr>
-          <p:cNvPr id="2" name="Title 1">
-            <a:extLst>
-              <a:ext uri="{FF2B5EF4-FFF2-40B4-BE49-F238E27FC236}">
-                <a16:creationId xmlns:a16="http://schemas.microsoft.com/office/drawing/2014/main" id="{A4168FF9-3F52-4F30-9F57-324B0195FBD7}"/>
-              </a:ext>
-            </a:extLst>
-          </p:cNvPr>
-          <p:cNvSpPr>
-            <a:spLocks noGrp="1"/>
-          </p:cNvSpPr>
-          <p:nvPr>
-            <p:ph type="ctrTitle"/>
-          </p:nvPr>
-        </p:nvSpPr>
-        <p:spPr>
-          <a:xfrm>
-            <a:off x="2078105" y="3803009"/>
-            <a:ext cx="8032742" cy="1999077"/>
-          </a:xfrm>
-        </p:spPr>
-        <p:txBody>
-          <a:bodyPr anchor="b">
-            <a:normAutofit/>
-          </a:bodyPr>
-          <a:lstStyle/>
-          <a:p>
-            <a:pPr algn="ctr"/>
-            <a:r>
-              <a:rPr lang="en-US" sz="2900" u="sng" dirty="0"/>
-              <a:t>Software architecture notes</a:t>
-            </a:r>
-            <a:br>
-              <a:rPr lang="en-US" sz="2900" u="sng" dirty="0"/>
-            </a:br>
-            <a:br>
-              <a:rPr lang="en-US" sz="2900" dirty="0"/>
-            </a:br>
-            <a:r>
-              <a:rPr lang="en-US" sz="2900" b="1" dirty="0"/>
-              <a:t>Throw exceptions instead of returning null (or not?)</a:t>
-            </a:r>
-            <a:endParaRPr lang="en-US" sz="2900" u="sng" dirty="0"/>
-          </a:p>
-        </p:txBody>
-      </p:sp>
-      <p:pic>
-        <p:nvPicPr>
-          <p:cNvPr id="5" name="Picture 4" descr="Logo&#10;&#10;Description automatically generated with medium confidence">
-            <a:extLst>
-              <a:ext uri="{FF2B5EF4-FFF2-40B4-BE49-F238E27FC236}">
-                <a16:creationId xmlns:a16="http://schemas.microsoft.com/office/drawing/2014/main" id="{07A3483B-1F6E-4D93-8E06-102933498B46}"/>
-              </a:ext>
-            </a:extLst>
-          </p:cNvPr>
-          <p:cNvPicPr>
-            <a:picLocks noChangeAspect="1"/>
-          </p:cNvPicPr>
-          <p:nvPr/>
-        </p:nvPicPr>
-        <p:blipFill>
-          <a:blip r:embed="rId5">
-            <a:extLst>
-              <a:ext uri="{28A0092B-C50C-407E-A947-70E740481C1C}">
-                <a14:useLocalDpi xmlns:a14="http://schemas.microsoft.com/office/drawing/2010/main" val="0"/>
-              </a:ext>
-            </a:extLst>
-          </a:blip>
-          <a:stretch>
-            <a:fillRect/>
-          </a:stretch>
-        </p:blipFill>
-        <p:spPr>
-          <a:xfrm>
-            <a:off x="4757166" y="643468"/>
-            <a:ext cx="2677667" cy="2795060"/>
-          </a:xfrm>
-          <a:prstGeom prst="rect">
-            <a:avLst/>
-          </a:prstGeom>
-        </p:spPr>
-      </p:pic>
-    </p:spTree>
-    <p:extLst>
-      <p:ext uri="{BB962C8B-B14F-4D97-AF65-F5344CB8AC3E}">
-        <p14:creationId xmlns:p14="http://schemas.microsoft.com/office/powerpoint/2010/main" val="1024463229"/>
-      </p:ext>
-    </p:extLst>
-  </p:cSld>
-  <p:clrMapOvr>
-    <a:masterClrMapping/>
   </p:clrMapOvr>
 </p:sld>
 </file>

</xml_diff>